<commit_message>
made changes to presentation
</commit_message>
<xml_diff>
--- a/Bike_Project/Mini project.pptx
+++ b/Bike_Project/Mini project.pptx
@@ -5,10 +5,10 @@
     <p:sldMasterId id="2147483666" r:id="rId4"/>
   </p:sldMasterIdLst>
   <p:notesMasterIdLst>
-    <p:notesMasterId r:id="rId25"/>
+    <p:notesMasterId r:id="rId29"/>
   </p:notesMasterIdLst>
   <p:handoutMasterIdLst>
-    <p:handoutMasterId r:id="rId26"/>
+    <p:handoutMasterId r:id="rId30"/>
   </p:handoutMasterIdLst>
   <p:sldIdLst>
     <p:sldId id="256" r:id="rId5"/>
@@ -19,18 +19,22 @@
     <p:sldId id="301" r:id="rId10"/>
     <p:sldId id="297" r:id="rId11"/>
     <p:sldId id="298" r:id="rId12"/>
-    <p:sldId id="304" r:id="rId13"/>
-    <p:sldId id="302" r:id="rId14"/>
-    <p:sldId id="303" r:id="rId15"/>
-    <p:sldId id="305" r:id="rId16"/>
+    <p:sldId id="302" r:id="rId13"/>
+    <p:sldId id="304" r:id="rId14"/>
+    <p:sldId id="305" r:id="rId15"/>
+    <p:sldId id="320" r:id="rId16"/>
     <p:sldId id="312" r:id="rId17"/>
     <p:sldId id="313" r:id="rId18"/>
-    <p:sldId id="306" r:id="rId19"/>
-    <p:sldId id="307" r:id="rId20"/>
-    <p:sldId id="308" r:id="rId21"/>
-    <p:sldId id="309" r:id="rId22"/>
-    <p:sldId id="311" r:id="rId23"/>
-    <p:sldId id="310" r:id="rId24"/>
+    <p:sldId id="310" r:id="rId19"/>
+    <p:sldId id="311" r:id="rId20"/>
+    <p:sldId id="321" r:id="rId21"/>
+    <p:sldId id="322" r:id="rId22"/>
+    <p:sldId id="316" r:id="rId23"/>
+    <p:sldId id="323" r:id="rId24"/>
+    <p:sldId id="317" r:id="rId25"/>
+    <p:sldId id="318" r:id="rId26"/>
+    <p:sldId id="324" r:id="rId27"/>
+    <p:sldId id="319" r:id="rId28"/>
   </p:sldIdLst>
   <p:sldSz cx="12192000" cy="6858000"/>
   <p:notesSz cx="6858000" cy="9144000"/>
@@ -257,7 +261,7 @@
           <a:p>
             <a:fld id="{F352A77B-D33C-49B3-A83C-450AA2ED72B3}" type="datetimeFigureOut">
               <a:rPr lang="en-US" smtClean="0"/>
-              <a:t>10/17/2024</a:t>
+              <a:t>10/18/2024</a:t>
             </a:fld>
             <a:endParaRPr lang="en-US" dirty="0"/>
           </a:p>
@@ -434,7 +438,7 @@
           <a:p>
             <a:fld id="{E38D8F9A-F5CB-4EF8-A859-ED5E107B9763}" type="datetimeFigureOut">
               <a:rPr lang="en-US" smtClean="0"/>
-              <a:t>10/17/2024</a:t>
+              <a:t>10/18/2024</a:t>
             </a:fld>
             <a:endParaRPr lang="en-US" dirty="0"/>
           </a:p>
@@ -16067,7 +16071,7 @@
         <p:cNvPr id="1" name="">
           <a:extLst>
             <a:ext uri="{FF2B5EF4-FFF2-40B4-BE49-F238E27FC236}">
-              <a16:creationId xmlns:a16="http://schemas.microsoft.com/office/drawing/2014/main" id="{1102994D-E6A5-A008-6045-C98B220940F2}"/>
+              <a16:creationId xmlns:a16="http://schemas.microsoft.com/office/drawing/2014/main" id="{658EF261-4AC7-DF04-DAAD-544C3B783B08}"/>
             </a:ext>
           </a:extLst>
         </p:cNvPr>
@@ -16087,7 +16091,7 @@
           <p:cNvPr id="2" name="Title 1">
             <a:extLst>
               <a:ext uri="{FF2B5EF4-FFF2-40B4-BE49-F238E27FC236}">
-                <a16:creationId xmlns:a16="http://schemas.microsoft.com/office/drawing/2014/main" id="{52D25B60-287F-FD66-69B1-ABA33D16C28B}"/>
+                <a16:creationId xmlns:a16="http://schemas.microsoft.com/office/drawing/2014/main" id="{3B3F93C3-68CF-0339-366A-43F3D3CCFFE7}"/>
               </a:ext>
             </a:extLst>
           </p:cNvPr>
@@ -16110,17 +16114,17 @@
           <a:p>
             <a:r>
               <a:rPr lang="en-US" dirty="0"/>
-              <a:t>EDA</a:t>
+              <a:t>Boxplot</a:t>
             </a:r>
           </a:p>
         </p:txBody>
       </p:sp>
       <p:pic>
         <p:nvPicPr>
-          <p:cNvPr id="4" name="Picture 3" descr="A graph of a graph of a number of bikes&#10;&#10;Description automatically generated with medium confidence">
-            <a:extLst>
-              <a:ext uri="{FF2B5EF4-FFF2-40B4-BE49-F238E27FC236}">
-                <a16:creationId xmlns:a16="http://schemas.microsoft.com/office/drawing/2014/main" id="{382DEFBE-A29C-4405-969F-300F8A86FC2E}"/>
+          <p:cNvPr id="4" name="Picture 3" descr="A diagram of a box plot&#10;&#10;Description automatically generated">
+            <a:extLst>
+              <a:ext uri="{FF2B5EF4-FFF2-40B4-BE49-F238E27FC236}">
+                <a16:creationId xmlns:a16="http://schemas.microsoft.com/office/drawing/2014/main" id="{70E2231F-FE2C-8D7E-2A3E-D3BE72853599}"/>
               </a:ext>
             </a:extLst>
           </p:cNvPr>
@@ -16137,8 +16141,8 @@
         </p:blipFill>
         <p:spPr>
           <a:xfrm>
-            <a:off x="-90852" y="1707503"/>
-            <a:ext cx="4350590" cy="3262942"/>
+            <a:off x="381447" y="1234435"/>
+            <a:ext cx="5852172" cy="4389129"/>
           </a:xfrm>
           <a:prstGeom prst="rect">
             <a:avLst/>
@@ -16147,10 +16151,10 @@
       </p:pic>
       <p:pic>
         <p:nvPicPr>
-          <p:cNvPr id="6" name="Picture 5" descr="A graph of a number of bikes&#10;&#10;Description automatically generated">
-            <a:extLst>
-              <a:ext uri="{FF2B5EF4-FFF2-40B4-BE49-F238E27FC236}">
-                <a16:creationId xmlns:a16="http://schemas.microsoft.com/office/drawing/2014/main" id="{B9BE9DD7-73C2-03C8-33FD-0E6F6CED0C90}"/>
+          <p:cNvPr id="7" name="Picture 6">
+            <a:extLst>
+              <a:ext uri="{FF2B5EF4-FFF2-40B4-BE49-F238E27FC236}">
+                <a16:creationId xmlns:a16="http://schemas.microsoft.com/office/drawing/2014/main" id="{BE4C65F8-1A5C-7F31-E446-089F51556E51}"/>
               </a:ext>
             </a:extLst>
           </p:cNvPr>
@@ -16167,38 +16171,8 @@
         </p:blipFill>
         <p:spPr>
           <a:xfrm>
-            <a:off x="3960331" y="1707501"/>
-            <a:ext cx="4350590" cy="3262943"/>
-          </a:xfrm>
-          <a:prstGeom prst="rect">
-            <a:avLst/>
-          </a:prstGeom>
-        </p:spPr>
-      </p:pic>
-      <p:pic>
-        <p:nvPicPr>
-          <p:cNvPr id="8" name="Picture 7" descr="A graph of a bicycle&#10;&#10;Description automatically generated with medium confidence">
-            <a:extLst>
-              <a:ext uri="{FF2B5EF4-FFF2-40B4-BE49-F238E27FC236}">
-                <a16:creationId xmlns:a16="http://schemas.microsoft.com/office/drawing/2014/main" id="{41467109-52DE-1B80-C545-9A1350247F88}"/>
-              </a:ext>
-            </a:extLst>
-          </p:cNvPr>
-          <p:cNvPicPr>
-            <a:picLocks noChangeAspect="1"/>
-          </p:cNvPicPr>
-          <p:nvPr/>
-        </p:nvPicPr>
-        <p:blipFill>
-          <a:blip r:embed="rId4"/>
-          <a:stretch>
-            <a:fillRect/>
-          </a:stretch>
-        </p:blipFill>
-        <p:spPr>
-          <a:xfrm>
-            <a:off x="7841411" y="1707501"/>
-            <a:ext cx="4350590" cy="3262943"/>
+            <a:off x="7170777" y="3190841"/>
+            <a:ext cx="3934374" cy="476316"/>
           </a:xfrm>
           <a:prstGeom prst="rect">
             <a:avLst/>
@@ -16208,7 +16182,7 @@
     </p:spTree>
     <p:extLst>
       <p:ext uri="{BB962C8B-B14F-4D97-AF65-F5344CB8AC3E}">
-        <p14:creationId xmlns:p14="http://schemas.microsoft.com/office/powerpoint/2010/main" val="436408081"/>
+        <p14:creationId xmlns:p14="http://schemas.microsoft.com/office/powerpoint/2010/main" val="2507869996"/>
       </p:ext>
     </p:extLst>
   </p:cSld>
@@ -16219,135 +16193,6 @@
 </file>
 
 <file path=ppt/slides/slide11.xml><?xml version="1.0" encoding="utf-8"?>
-<p:sld xmlns:a="http://schemas.openxmlformats.org/drawingml/2006/main" xmlns:r="http://schemas.openxmlformats.org/officeDocument/2006/relationships" xmlns:p="http://schemas.openxmlformats.org/presentationml/2006/main">
-  <p:cSld>
-    <p:spTree>
-      <p:nvGrpSpPr>
-        <p:cNvPr id="1" name="">
-          <a:extLst>
-            <a:ext uri="{FF2B5EF4-FFF2-40B4-BE49-F238E27FC236}">
-              <a16:creationId xmlns:a16="http://schemas.microsoft.com/office/drawing/2014/main" id="{E51A86C5-3866-C79E-1F1D-0D660B50D453}"/>
-            </a:ext>
-          </a:extLst>
-        </p:cNvPr>
-        <p:cNvGrpSpPr/>
-        <p:nvPr/>
-      </p:nvGrpSpPr>
-      <p:grpSpPr>
-        <a:xfrm>
-          <a:off x="0" y="0"/>
-          <a:ext cx="0" cy="0"/>
-          <a:chOff x="0" y="0"/>
-          <a:chExt cx="0" cy="0"/>
-        </a:xfrm>
-      </p:grpSpPr>
-      <p:sp>
-        <p:nvSpPr>
-          <p:cNvPr id="2" name="Title 1">
-            <a:extLst>
-              <a:ext uri="{FF2B5EF4-FFF2-40B4-BE49-F238E27FC236}">
-                <a16:creationId xmlns:a16="http://schemas.microsoft.com/office/drawing/2014/main" id="{A6D4350A-246F-A19E-A40F-B1C6972453BB}"/>
-              </a:ext>
-            </a:extLst>
-          </p:cNvPr>
-          <p:cNvSpPr>
-            <a:spLocks noGrp="1"/>
-          </p:cNvSpPr>
-          <p:nvPr>
-            <p:ph type="title"/>
-          </p:nvPr>
-        </p:nvSpPr>
-        <p:spPr>
-          <a:xfrm>
-            <a:off x="1885156" y="72991"/>
-            <a:ext cx="8421688" cy="1325563"/>
-          </a:xfrm>
-        </p:spPr>
-        <p:txBody>
-          <a:bodyPr/>
-          <a:lstStyle/>
-          <a:p>
-            <a:r>
-              <a:rPr lang="en-US" dirty="0"/>
-              <a:t>EDA</a:t>
-            </a:r>
-          </a:p>
-        </p:txBody>
-      </p:sp>
-      <p:pic>
-        <p:nvPicPr>
-          <p:cNvPr id="4" name="Picture 3" descr="A graph of a graph showing the weather&#10;&#10;Description automatically generated with medium confidence">
-            <a:extLst>
-              <a:ext uri="{FF2B5EF4-FFF2-40B4-BE49-F238E27FC236}">
-                <a16:creationId xmlns:a16="http://schemas.microsoft.com/office/drawing/2014/main" id="{B0E722D7-6DEB-E63E-A3BF-79B9E95D388F}"/>
-              </a:ext>
-            </a:extLst>
-          </p:cNvPr>
-          <p:cNvPicPr>
-            <a:picLocks noChangeAspect="1"/>
-          </p:cNvPicPr>
-          <p:nvPr/>
-        </p:nvPicPr>
-        <p:blipFill>
-          <a:blip r:embed="rId2"/>
-          <a:stretch>
-            <a:fillRect/>
-          </a:stretch>
-        </p:blipFill>
-        <p:spPr>
-          <a:xfrm>
-            <a:off x="487656" y="1234433"/>
-            <a:ext cx="5852172" cy="4389129"/>
-          </a:xfrm>
-          <a:prstGeom prst="rect">
-            <a:avLst/>
-          </a:prstGeom>
-        </p:spPr>
-      </p:pic>
-      <p:pic>
-        <p:nvPicPr>
-          <p:cNvPr id="6" name="Picture 5" descr="A graph of a number of bikes&#10;&#10;Description automatically generated">
-            <a:extLst>
-              <a:ext uri="{FF2B5EF4-FFF2-40B4-BE49-F238E27FC236}">
-                <a16:creationId xmlns:a16="http://schemas.microsoft.com/office/drawing/2014/main" id="{C666F64A-81CE-96C7-7DFB-9F03136C77DF}"/>
-              </a:ext>
-            </a:extLst>
-          </p:cNvPr>
-          <p:cNvPicPr>
-            <a:picLocks noChangeAspect="1"/>
-          </p:cNvPicPr>
-          <p:nvPr/>
-        </p:nvPicPr>
-        <p:blipFill>
-          <a:blip r:embed="rId3"/>
-          <a:stretch>
-            <a:fillRect/>
-          </a:stretch>
-        </p:blipFill>
-        <p:spPr>
-          <a:xfrm>
-            <a:off x="6339828" y="1234434"/>
-            <a:ext cx="5852172" cy="4389129"/>
-          </a:xfrm>
-          <a:prstGeom prst="rect">
-            <a:avLst/>
-          </a:prstGeom>
-        </p:spPr>
-      </p:pic>
-    </p:spTree>
-    <p:extLst>
-      <p:ext uri="{BB962C8B-B14F-4D97-AF65-F5344CB8AC3E}">
-        <p14:creationId xmlns:p14="http://schemas.microsoft.com/office/powerpoint/2010/main" val="3851762790"/>
-      </p:ext>
-    </p:extLst>
-  </p:cSld>
-  <p:clrMapOvr>
-    <a:masterClrMapping/>
-  </p:clrMapOvr>
-</p:sld>
-</file>
-
-<file path=ppt/slides/slide12.xml><?xml version="1.0" encoding="utf-8"?>
 <p:sld xmlns:a="http://schemas.openxmlformats.org/drawingml/2006/main" xmlns:r="http://schemas.openxmlformats.org/officeDocument/2006/relationships" xmlns:p="http://schemas.openxmlformats.org/presentationml/2006/main">
   <p:cSld>
     <p:spTree>
@@ -16388,8 +16233,8 @@
         </p:nvSpPr>
         <p:spPr>
           <a:xfrm>
-            <a:off x="1885156" y="72991"/>
-            <a:ext cx="8421688" cy="1325563"/>
+            <a:off x="3585172" y="108642"/>
+            <a:ext cx="3971453" cy="655607"/>
           </a:xfrm>
         </p:spPr>
         <p:txBody>
@@ -16398,7 +16243,7 @@
           <a:p>
             <a:r>
               <a:rPr lang="en-US" dirty="0"/>
-              <a:t>EDA</a:t>
+              <a:t>Correlation plots</a:t>
             </a:r>
           </a:p>
         </p:txBody>
@@ -16425,7 +16270,7 @@
         </p:blipFill>
         <p:spPr>
           <a:xfrm>
-            <a:off x="322276" y="0"/>
+            <a:off x="304169" y="1218967"/>
             <a:ext cx="4961299" cy="4420066"/>
           </a:xfrm>
           <a:prstGeom prst="rect">
@@ -16435,10 +16280,10 @@
       </p:pic>
       <p:pic>
         <p:nvPicPr>
-          <p:cNvPr id="17" name="Picture 16" descr="A graph showing a number of blue squares&#10;&#10;Description automatically generated with medium confidence">
-            <a:extLst>
-              <a:ext uri="{FF2B5EF4-FFF2-40B4-BE49-F238E27FC236}">
-                <a16:creationId xmlns:a16="http://schemas.microsoft.com/office/drawing/2014/main" id="{8683419C-72DD-C30B-BD1D-506D2F84FD49}"/>
+          <p:cNvPr id="4" name="Picture 3" descr="A graph with blue lines&#10;&#10;Description automatically generated">
+            <a:extLst>
+              <a:ext uri="{FF2B5EF4-FFF2-40B4-BE49-F238E27FC236}">
+                <a16:creationId xmlns:a16="http://schemas.microsoft.com/office/drawing/2014/main" id="{2B3E420A-6DF8-AEF9-70B7-9B2FE311C8E1}"/>
               </a:ext>
             </a:extLst>
           </p:cNvPr>
@@ -16455,8 +16300,8 @@
         </p:blipFill>
         <p:spPr>
           <a:xfrm>
-            <a:off x="322276" y="4389115"/>
-            <a:ext cx="11265430" cy="2468885"/>
+            <a:off x="5994410" y="1218967"/>
+            <a:ext cx="5893421" cy="4420066"/>
           </a:xfrm>
           <a:prstGeom prst="rect">
             <a:avLst/>
@@ -16467,6 +16312,107 @@
     <p:extLst>
       <p:ext uri="{BB962C8B-B14F-4D97-AF65-F5344CB8AC3E}">
         <p14:creationId xmlns:p14="http://schemas.microsoft.com/office/powerpoint/2010/main" val="3949004980"/>
+      </p:ext>
+    </p:extLst>
+  </p:cSld>
+  <p:clrMapOvr>
+    <a:masterClrMapping/>
+  </p:clrMapOvr>
+</p:sld>
+</file>
+
+<file path=ppt/slides/slide12.xml><?xml version="1.0" encoding="utf-8"?>
+<p:sld xmlns:a="http://schemas.openxmlformats.org/drawingml/2006/main" xmlns:r="http://schemas.openxmlformats.org/officeDocument/2006/relationships" xmlns:p="http://schemas.openxmlformats.org/presentationml/2006/main">
+  <p:cSld>
+    <p:spTree>
+      <p:nvGrpSpPr>
+        <p:cNvPr id="1" name="">
+          <a:extLst>
+            <a:ext uri="{FF2B5EF4-FFF2-40B4-BE49-F238E27FC236}">
+              <a16:creationId xmlns:a16="http://schemas.microsoft.com/office/drawing/2014/main" id="{F8C626D2-D3A8-4BF8-AF57-A502A280D8F5}"/>
+            </a:ext>
+          </a:extLst>
+        </p:cNvPr>
+        <p:cNvGrpSpPr/>
+        <p:nvPr/>
+      </p:nvGrpSpPr>
+      <p:grpSpPr>
+        <a:xfrm>
+          <a:off x="0" y="0"/>
+          <a:ext cx="0" cy="0"/>
+          <a:chOff x="0" y="0"/>
+          <a:chExt cx="0" cy="0"/>
+        </a:xfrm>
+      </p:grpSpPr>
+      <p:sp>
+        <p:nvSpPr>
+          <p:cNvPr id="2" name="Title 1">
+            <a:extLst>
+              <a:ext uri="{FF2B5EF4-FFF2-40B4-BE49-F238E27FC236}">
+                <a16:creationId xmlns:a16="http://schemas.microsoft.com/office/drawing/2014/main" id="{02734E51-3918-27B2-840B-FB120229F086}"/>
+              </a:ext>
+            </a:extLst>
+          </p:cNvPr>
+          <p:cNvSpPr>
+            <a:spLocks noGrp="1"/>
+          </p:cNvSpPr>
+          <p:nvPr>
+            <p:ph type="title"/>
+          </p:nvPr>
+        </p:nvSpPr>
+        <p:spPr>
+          <a:xfrm>
+            <a:off x="3734555" y="280657"/>
+            <a:ext cx="4722890" cy="655607"/>
+          </a:xfrm>
+        </p:spPr>
+        <p:txBody>
+          <a:bodyPr>
+            <a:noAutofit/>
+          </a:bodyPr>
+          <a:lstStyle/>
+          <a:p>
+            <a:r>
+              <a:rPr lang="en-US" dirty="0"/>
+              <a:t>Target variable plot</a:t>
+            </a:r>
+          </a:p>
+        </p:txBody>
+      </p:sp>
+      <p:pic>
+        <p:nvPicPr>
+          <p:cNvPr id="5" name="Picture 4" descr="A graph showing a number of blue squares&#10;&#10;Description automatically generated with medium confidence">
+            <a:extLst>
+              <a:ext uri="{FF2B5EF4-FFF2-40B4-BE49-F238E27FC236}">
+                <a16:creationId xmlns:a16="http://schemas.microsoft.com/office/drawing/2014/main" id="{8B2B0AC3-E1F4-FEA2-688C-2AA74F44BDCC}"/>
+              </a:ext>
+            </a:extLst>
+          </p:cNvPr>
+          <p:cNvPicPr>
+            <a:picLocks noChangeAspect="1"/>
+          </p:cNvPicPr>
+          <p:nvPr/>
+        </p:nvPicPr>
+        <p:blipFill>
+          <a:blip r:embed="rId2"/>
+          <a:stretch>
+            <a:fillRect/>
+          </a:stretch>
+        </p:blipFill>
+        <p:spPr>
+          <a:xfrm>
+            <a:off x="463285" y="2194557"/>
+            <a:ext cx="11265430" cy="2468885"/>
+          </a:xfrm>
+          <a:prstGeom prst="rect">
+            <a:avLst/>
+          </a:prstGeom>
+        </p:spPr>
+      </p:pic>
+    </p:spTree>
+    <p:extLst>
+      <p:ext uri="{BB962C8B-B14F-4D97-AF65-F5344CB8AC3E}">
+        <p14:creationId xmlns:p14="http://schemas.microsoft.com/office/powerpoint/2010/main" val="3436758733"/>
       </p:ext>
     </p:extLst>
   </p:cSld>
@@ -16586,8 +16532,8 @@
         </p:nvSpPr>
         <p:spPr>
           <a:xfrm>
-            <a:off x="1885156" y="72991"/>
-            <a:ext cx="8421688" cy="1325563"/>
+            <a:off x="1023042" y="846293"/>
+            <a:ext cx="4436198" cy="552261"/>
           </a:xfrm>
         </p:spPr>
         <p:txBody>
@@ -16596,7 +16542,7 @@
           <a:p>
             <a:r>
               <a:rPr lang="en-US" dirty="0"/>
-              <a:t>Model Training</a:t>
+              <a:t>Model Types</a:t>
             </a:r>
           </a:p>
         </p:txBody>
@@ -16616,7 +16562,7 @@
         <p:spPr>
           <a:xfrm>
             <a:off x="1167897" y="1398554"/>
-            <a:ext cx="5522614" cy="2308324"/>
+            <a:ext cx="4825497" cy="1569660"/>
           </a:xfrm>
           <a:prstGeom prst="rect">
             <a:avLst/>
@@ -16645,7 +16591,7 @@
             </a:pPr>
             <a:r>
               <a:rPr lang="en-US" sz="2400" dirty="0"/>
-              <a:t>Standardized Linear Regression</a:t>
+              <a:t>Support Vector Machine</a:t>
             </a:r>
           </a:p>
           <a:p>
@@ -16655,7 +16601,7 @@
             </a:pPr>
             <a:r>
               <a:rPr lang="en-US" sz="2400" dirty="0"/>
-              <a:t>Regularized Linear Regression</a:t>
+              <a:t>Random Forest</a:t>
             </a:r>
           </a:p>
           <a:p>
@@ -16665,26 +16611,6 @@
             </a:pPr>
             <a:r>
               <a:rPr lang="en-US" sz="2400" dirty="0"/>
-              <a:t>Support Vector Machine</a:t>
-            </a:r>
-          </a:p>
-          <a:p>
-            <a:pPr marL="457200" indent="-457200">
-              <a:buFont typeface="+mj-lt"/>
-              <a:buAutoNum type="arabicPeriod"/>
-            </a:pPr>
-            <a:r>
-              <a:rPr lang="en-US" sz="2400" dirty="0"/>
-              <a:t>Random Forest</a:t>
-            </a:r>
-          </a:p>
-          <a:p>
-            <a:pPr marL="457200" indent="-457200">
-              <a:buFont typeface="+mj-lt"/>
-              <a:buAutoNum type="arabicPeriod"/>
-            </a:pPr>
-            <a:r>
-              <a:rPr lang="en-US" sz="2400" dirty="0"/>
               <a:t>Neural Network</a:t>
             </a:r>
           </a:p>
@@ -16704,8 +16630,8 @@
         </p:nvSpPr>
         <p:spPr>
           <a:xfrm>
-            <a:off x="1167897" y="4616942"/>
-            <a:ext cx="5522614" cy="830997"/>
+            <a:off x="6464094" y="1398554"/>
+            <a:ext cx="2372008" cy="830997"/>
           </a:xfrm>
           <a:prstGeom prst="rect">
             <a:avLst/>
@@ -16736,6 +16662,146 @@
               <a:rPr lang="en-US" sz="2400" dirty="0"/>
               <a:t>Test  set: 20%</a:t>
             </a:r>
+          </a:p>
+        </p:txBody>
+      </p:sp>
+      <p:sp>
+        <p:nvSpPr>
+          <p:cNvPr id="4" name="TextBox 3">
+            <a:extLst>
+              <a:ext uri="{FF2B5EF4-FFF2-40B4-BE49-F238E27FC236}">
+                <a16:creationId xmlns:a16="http://schemas.microsoft.com/office/drawing/2014/main" id="{E6680DBB-4750-A8B0-330F-575457CF0E71}"/>
+              </a:ext>
+            </a:extLst>
+          </p:cNvPr>
+          <p:cNvSpPr txBox="1"/>
+          <p:nvPr/>
+        </p:nvSpPr>
+        <p:spPr>
+          <a:xfrm>
+            <a:off x="5993394" y="846293"/>
+            <a:ext cx="3313408" cy="523220"/>
+          </a:xfrm>
+          <a:prstGeom prst="rect">
+            <a:avLst/>
+          </a:prstGeom>
+          <a:noFill/>
+        </p:spPr>
+        <p:txBody>
+          <a:bodyPr wrap="none" rtlCol="0">
+            <a:spAutoFit/>
+          </a:bodyPr>
+          <a:lstStyle/>
+          <a:p>
+            <a:r>
+              <a:rPr lang="en-GB" sz="2800" dirty="0">
+                <a:solidFill>
+                  <a:schemeClr val="tx1">
+                    <a:lumMod val="75000"/>
+                    <a:lumOff val="25000"/>
+                  </a:schemeClr>
+                </a:solidFill>
+                <a:latin typeface="+mj-lt"/>
+              </a:rPr>
+              <a:t>DATASET SPLITTING</a:t>
+            </a:r>
+            <a:endParaRPr lang="en-US" sz="2800" dirty="0">
+              <a:solidFill>
+                <a:schemeClr val="tx1">
+                  <a:lumMod val="75000"/>
+                  <a:lumOff val="25000"/>
+                </a:schemeClr>
+              </a:solidFill>
+              <a:latin typeface="+mj-lt"/>
+            </a:endParaRPr>
+          </a:p>
+        </p:txBody>
+      </p:sp>
+      <p:sp>
+        <p:nvSpPr>
+          <p:cNvPr id="6" name="TextBox 5">
+            <a:extLst>
+              <a:ext uri="{FF2B5EF4-FFF2-40B4-BE49-F238E27FC236}">
+                <a16:creationId xmlns:a16="http://schemas.microsoft.com/office/drawing/2014/main" id="{46B533F0-6E50-85A3-EDE2-C79D980C9321}"/>
+              </a:ext>
+            </a:extLst>
+          </p:cNvPr>
+          <p:cNvSpPr txBox="1"/>
+          <p:nvPr/>
+        </p:nvSpPr>
+        <p:spPr>
+          <a:xfrm>
+            <a:off x="3161688" y="3520475"/>
+            <a:ext cx="4595104" cy="523220"/>
+          </a:xfrm>
+          <a:prstGeom prst="rect">
+            <a:avLst/>
+          </a:prstGeom>
+          <a:noFill/>
+        </p:spPr>
+        <p:txBody>
+          <a:bodyPr wrap="none" rtlCol="0">
+            <a:spAutoFit/>
+          </a:bodyPr>
+          <a:lstStyle/>
+          <a:p>
+            <a:r>
+              <a:rPr lang="en-GB" sz="2800" dirty="0">
+                <a:solidFill>
+                  <a:schemeClr val="tx1">
+                    <a:lumMod val="75000"/>
+                    <a:lumOff val="25000"/>
+                  </a:schemeClr>
+                </a:solidFill>
+                <a:latin typeface="+mj-lt"/>
+              </a:rPr>
+              <a:t>HYPERPARAMETER TUNUNG</a:t>
+            </a:r>
+            <a:endParaRPr lang="en-US" sz="2800" dirty="0">
+              <a:solidFill>
+                <a:schemeClr val="tx1">
+                  <a:lumMod val="75000"/>
+                  <a:lumOff val="25000"/>
+                </a:schemeClr>
+              </a:solidFill>
+              <a:latin typeface="+mj-lt"/>
+            </a:endParaRPr>
+          </a:p>
+        </p:txBody>
+      </p:sp>
+      <p:sp>
+        <p:nvSpPr>
+          <p:cNvPr id="7" name="TextBox 6">
+            <a:extLst>
+              <a:ext uri="{FF2B5EF4-FFF2-40B4-BE49-F238E27FC236}">
+                <a16:creationId xmlns:a16="http://schemas.microsoft.com/office/drawing/2014/main" id="{8D2FB775-E7CE-9803-34E7-452A4708EBB9}"/>
+              </a:ext>
+            </a:extLst>
+          </p:cNvPr>
+          <p:cNvSpPr txBox="1"/>
+          <p:nvPr/>
+        </p:nvSpPr>
+        <p:spPr>
+          <a:xfrm>
+            <a:off x="4460857" y="4134291"/>
+            <a:ext cx="1996765" cy="461665"/>
+          </a:xfrm>
+          <a:prstGeom prst="rect">
+            <a:avLst/>
+          </a:prstGeom>
+          <a:noFill/>
+        </p:spPr>
+        <p:txBody>
+          <a:bodyPr wrap="none" rtlCol="0">
+            <a:spAutoFit/>
+          </a:bodyPr>
+          <a:lstStyle/>
+          <a:p>
+            <a:r>
+              <a:rPr lang="en-GB" sz="2400" dirty="0"/>
+              <a:t>GridSearchCV</a:t>
+            </a:r>
+            <a:endParaRPr lang="en-US" sz="2400" dirty="0"/>
           </a:p>
         </p:txBody>
       </p:sp>
@@ -16760,7 +16826,7 @@
         <p:cNvPr id="1" name="">
           <a:extLst>
             <a:ext uri="{FF2B5EF4-FFF2-40B4-BE49-F238E27FC236}">
-              <a16:creationId xmlns:a16="http://schemas.microsoft.com/office/drawing/2014/main" id="{23409DFC-6B36-CC9F-F61E-D4AF45DC476C}"/>
+              <a16:creationId xmlns:a16="http://schemas.microsoft.com/office/drawing/2014/main" id="{7C7B2D23-40F5-6BD1-0202-98DDFDABF268}"/>
             </a:ext>
           </a:extLst>
         </p:cNvPr>
@@ -16780,7 +16846,7 @@
           <p:cNvPr id="2" name="Title 1">
             <a:extLst>
               <a:ext uri="{FF2B5EF4-FFF2-40B4-BE49-F238E27FC236}">
-                <a16:creationId xmlns:a16="http://schemas.microsoft.com/office/drawing/2014/main" id="{C45AB11E-7F2B-B49E-3307-64CA6DA469CF}"/>
+                <a16:creationId xmlns:a16="http://schemas.microsoft.com/office/drawing/2014/main" id="{A973CDF4-4957-10FA-D184-EF09BC05B811}"/>
               </a:ext>
             </a:extLst>
           </p:cNvPr>
@@ -16793,7 +16859,7 @@
         </p:nvSpPr>
         <p:spPr>
           <a:xfrm>
-            <a:off x="762526" y="70338"/>
+            <a:off x="1885156" y="72991"/>
             <a:ext cx="8421688" cy="1325563"/>
           </a:xfrm>
         </p:spPr>
@@ -16803,17 +16869,17 @@
           <a:p>
             <a:r>
               <a:rPr lang="en-US" dirty="0"/>
-              <a:t>Linear Regression Performance</a:t>
+              <a:t>Model comparison</a:t>
             </a:r>
           </a:p>
         </p:txBody>
       </p:sp>
       <p:pic>
         <p:nvPicPr>
-          <p:cNvPr id="4" name="Picture 3" descr="A graph showing a plot of values&#10;&#10;Description automatically generated with medium confidence">
-            <a:extLst>
-              <a:ext uri="{FF2B5EF4-FFF2-40B4-BE49-F238E27FC236}">
-                <a16:creationId xmlns:a16="http://schemas.microsoft.com/office/drawing/2014/main" id="{D99C3854-C798-7ED2-3A4C-F7EF95469990}"/>
+          <p:cNvPr id="5" name="Picture 4" descr="A graph showing different types of performance&#10;&#10;Description automatically generated">
+            <a:extLst>
+              <a:ext uri="{FF2B5EF4-FFF2-40B4-BE49-F238E27FC236}">
+                <a16:creationId xmlns:a16="http://schemas.microsoft.com/office/drawing/2014/main" id="{27F00FEA-0247-2E72-2C40-A2C68D0D814A}"/>
               </a:ext>
             </a:extLst>
           </p:cNvPr>
@@ -16830,320 +16896,18 @@
         </p:blipFill>
         <p:spPr>
           <a:xfrm>
-            <a:off x="4665550" y="1787378"/>
-            <a:ext cx="3763224" cy="2822418"/>
+            <a:off x="1523991" y="1066039"/>
+            <a:ext cx="9144018" cy="5486411"/>
           </a:xfrm>
           <a:prstGeom prst="rect">
             <a:avLst/>
           </a:prstGeom>
         </p:spPr>
       </p:pic>
-      <p:pic>
-        <p:nvPicPr>
-          <p:cNvPr id="6" name="Picture 5" descr="A graph showing a plot of values&#10;&#10;Description automatically generated with medium confidence">
-            <a:extLst>
-              <a:ext uri="{FF2B5EF4-FFF2-40B4-BE49-F238E27FC236}">
-                <a16:creationId xmlns:a16="http://schemas.microsoft.com/office/drawing/2014/main" id="{83D821FF-4F7A-5A83-9ACA-E941FFF1CD89}"/>
-              </a:ext>
-            </a:extLst>
-          </p:cNvPr>
-          <p:cNvPicPr>
-            <a:picLocks noChangeAspect="1"/>
-          </p:cNvPicPr>
-          <p:nvPr/>
-        </p:nvPicPr>
-        <p:blipFill>
-          <a:blip r:embed="rId3"/>
-          <a:stretch>
-            <a:fillRect/>
-          </a:stretch>
-        </p:blipFill>
-        <p:spPr>
-          <a:xfrm>
-            <a:off x="8428776" y="2841636"/>
-            <a:ext cx="3763224" cy="2822418"/>
-          </a:xfrm>
-          <a:prstGeom prst="rect">
-            <a:avLst/>
-          </a:prstGeom>
-        </p:spPr>
-      </p:pic>
-      <p:pic>
-        <p:nvPicPr>
-          <p:cNvPr id="8" name="Picture 7" descr="A graph showing a plot of values&#10;&#10;Description automatically generated">
-            <a:extLst>
-              <a:ext uri="{FF2B5EF4-FFF2-40B4-BE49-F238E27FC236}">
-                <a16:creationId xmlns:a16="http://schemas.microsoft.com/office/drawing/2014/main" id="{13658C7C-FFB3-90E5-FF63-2BEE63ECB8DE}"/>
-              </a:ext>
-            </a:extLst>
-          </p:cNvPr>
-          <p:cNvPicPr>
-            <a:picLocks noChangeAspect="1"/>
-          </p:cNvPicPr>
-          <p:nvPr/>
-        </p:nvPicPr>
-        <p:blipFill>
-          <a:blip r:embed="rId4"/>
-          <a:stretch>
-            <a:fillRect/>
-          </a:stretch>
-        </p:blipFill>
-        <p:spPr>
-          <a:xfrm>
-            <a:off x="8428776" y="19217"/>
-            <a:ext cx="3763226" cy="2822419"/>
-          </a:xfrm>
-          <a:prstGeom prst="rect">
-            <a:avLst/>
-          </a:prstGeom>
-        </p:spPr>
-      </p:pic>
-      <p:graphicFrame>
-        <p:nvGraphicFramePr>
-          <p:cNvPr id="10" name="Table 9">
-            <a:extLst>
-              <a:ext uri="{FF2B5EF4-FFF2-40B4-BE49-F238E27FC236}">
-                <a16:creationId xmlns:a16="http://schemas.microsoft.com/office/drawing/2014/main" id="{B4E4C0C8-8C8E-F861-26F4-1FAA21CF6D05}"/>
-              </a:ext>
-            </a:extLst>
-          </p:cNvPr>
-          <p:cNvGraphicFramePr>
-            <a:graphicFrameLocks noGrp="1"/>
-          </p:cNvGraphicFramePr>
-          <p:nvPr>
-            <p:extLst>
-              <p:ext uri="{D42A27DB-BD31-4B8C-83A1-F6EECF244321}">
-                <p14:modId xmlns:p14="http://schemas.microsoft.com/office/powerpoint/2010/main" val="525286053"/>
-              </p:ext>
-            </p:extLst>
-          </p:nvPr>
-        </p:nvGraphicFramePr>
-        <p:xfrm>
-          <a:off x="194148" y="1300850"/>
-          <a:ext cx="4471398" cy="4203656"/>
-        </p:xfrm>
-        <a:graphic>
-          <a:graphicData uri="http://schemas.openxmlformats.org/drawingml/2006/table">
-            <a:tbl>
-              <a:tblPr firstRow="1" bandRow="1">
-                <a:tableStyleId>{5940675A-B579-460E-94D1-54222C63F5DA}</a:tableStyleId>
-              </a:tblPr>
-              <a:tblGrid>
-                <a:gridCol w="1490466">
-                  <a:extLst>
-                    <a:ext uri="{9D8B030D-6E8A-4147-A177-3AD203B41FA5}">
-                      <a16:colId xmlns:a16="http://schemas.microsoft.com/office/drawing/2014/main" val="1401693986"/>
-                    </a:ext>
-                  </a:extLst>
-                </a:gridCol>
-                <a:gridCol w="1490466">
-                  <a:extLst>
-                    <a:ext uri="{9D8B030D-6E8A-4147-A177-3AD203B41FA5}">
-                      <a16:colId xmlns:a16="http://schemas.microsoft.com/office/drawing/2014/main" val="3909165591"/>
-                    </a:ext>
-                  </a:extLst>
-                </a:gridCol>
-                <a:gridCol w="1490466">
-                  <a:extLst>
-                    <a:ext uri="{9D8B030D-6E8A-4147-A177-3AD203B41FA5}">
-                      <a16:colId xmlns:a16="http://schemas.microsoft.com/office/drawing/2014/main" val="1379050625"/>
-                    </a:ext>
-                  </a:extLst>
-                </a:gridCol>
-              </a:tblGrid>
-              <a:tr h="934642">
-                <a:tc>
-                  <a:txBody>
-                    <a:bodyPr/>
-                    <a:lstStyle/>
-                    <a:p>
-                      <a:endParaRPr lang="en-US" dirty="0"/>
-                    </a:p>
-                  </a:txBody>
-                  <a:tcPr/>
-                </a:tc>
-                <a:tc>
-                  <a:txBody>
-                    <a:bodyPr/>
-                    <a:lstStyle/>
-                    <a:p>
-                      <a:r>
-                        <a:rPr lang="en-US" dirty="0"/>
-                        <a:t>RMSE</a:t>
-                      </a:r>
-                    </a:p>
-                  </a:txBody>
-                  <a:tcPr/>
-                </a:tc>
-                <a:tc>
-                  <a:txBody>
-                    <a:bodyPr/>
-                    <a:lstStyle/>
-                    <a:p>
-                      <a:r>
-                        <a:rPr lang="en-US" dirty="0"/>
-                        <a:t>R</a:t>
-                      </a:r>
-                      <a:r>
-                        <a:rPr lang="en-US" baseline="30000" dirty="0"/>
-                        <a:t>2</a:t>
-                      </a:r>
-                    </a:p>
-                  </a:txBody>
-                  <a:tcPr/>
-                </a:tc>
-                <a:extLst>
-                  <a:ext uri="{0D108BD9-81ED-4DB2-BD59-A6C34878D82A}">
-                    <a16:rowId xmlns:a16="http://schemas.microsoft.com/office/drawing/2014/main" val="657843193"/>
-                  </a:ext>
-                </a:extLst>
-              </a:tr>
-              <a:tr h="934642">
-                <a:tc>
-                  <a:txBody>
-                    <a:bodyPr/>
-                    <a:lstStyle/>
-                    <a:p>
-                      <a:r>
-                        <a:rPr lang="en-US" dirty="0"/>
-                        <a:t>Linear Regression</a:t>
-                      </a:r>
-                    </a:p>
-                  </a:txBody>
-                  <a:tcPr/>
-                </a:tc>
-                <a:tc>
-                  <a:txBody>
-                    <a:bodyPr/>
-                    <a:lstStyle/>
-                    <a:p>
-                      <a:r>
-                        <a:rPr lang="en-US" dirty="0"/>
-                        <a:t>102.283</a:t>
-                      </a:r>
-                    </a:p>
-                  </a:txBody>
-                  <a:tcPr/>
-                </a:tc>
-                <a:tc>
-                  <a:txBody>
-                    <a:bodyPr/>
-                    <a:lstStyle/>
-                    <a:p>
-                      <a:r>
-                        <a:rPr lang="en-US" dirty="0"/>
-                        <a:t>0.678</a:t>
-                      </a:r>
-                    </a:p>
-                  </a:txBody>
-                  <a:tcPr/>
-                </a:tc>
-                <a:extLst>
-                  <a:ext uri="{0D108BD9-81ED-4DB2-BD59-A6C34878D82A}">
-                    <a16:rowId xmlns:a16="http://schemas.microsoft.com/office/drawing/2014/main" val="3090176616"/>
-                  </a:ext>
-                </a:extLst>
-              </a:tr>
-              <a:tr h="1167186">
-                <a:tc>
-                  <a:txBody>
-                    <a:bodyPr/>
-                    <a:lstStyle/>
-                    <a:p>
-                      <a:r>
-                        <a:rPr lang="en-US" dirty="0"/>
-                        <a:t>Standardized Regular Regression</a:t>
-                      </a:r>
-                    </a:p>
-                  </a:txBody>
-                  <a:tcPr/>
-                </a:tc>
-                <a:tc>
-                  <a:txBody>
-                    <a:bodyPr/>
-                    <a:lstStyle/>
-                    <a:p>
-                      <a:r>
-                        <a:rPr lang="en-US" dirty="0"/>
-                        <a:t>102.293</a:t>
-                      </a:r>
-                    </a:p>
-                  </a:txBody>
-                  <a:tcPr/>
-                </a:tc>
-                <a:tc>
-                  <a:txBody>
-                    <a:bodyPr/>
-                    <a:lstStyle/>
-                    <a:p>
-                      <a:r>
-                        <a:rPr lang="en-US" dirty="0"/>
-                        <a:t>0.677</a:t>
-                      </a:r>
-                    </a:p>
-                  </a:txBody>
-                  <a:tcPr/>
-                </a:tc>
-                <a:extLst>
-                  <a:ext uri="{0D108BD9-81ED-4DB2-BD59-A6C34878D82A}">
-                    <a16:rowId xmlns:a16="http://schemas.microsoft.com/office/drawing/2014/main" val="629130200"/>
-                  </a:ext>
-                </a:extLst>
-              </a:tr>
-              <a:tr h="1167186">
-                <a:tc>
-                  <a:txBody>
-                    <a:bodyPr/>
-                    <a:lstStyle/>
-                    <a:p>
-                      <a:r>
-                        <a:rPr lang="en-US" dirty="0"/>
-                        <a:t>Regularized Regular Regression</a:t>
-                      </a:r>
-                    </a:p>
-                  </a:txBody>
-                  <a:tcPr/>
-                </a:tc>
-                <a:tc>
-                  <a:txBody>
-                    <a:bodyPr/>
-                    <a:lstStyle/>
-                    <a:p>
-                      <a:r>
-                        <a:rPr lang="en-US" dirty="0"/>
-                        <a:t>102.261</a:t>
-                      </a:r>
-                    </a:p>
-                  </a:txBody>
-                  <a:tcPr/>
-                </a:tc>
-                <a:tc>
-                  <a:txBody>
-                    <a:bodyPr/>
-                    <a:lstStyle/>
-                    <a:p>
-                      <a:r>
-                        <a:rPr lang="en-US" dirty="0"/>
-                        <a:t>0.678</a:t>
-                      </a:r>
-                    </a:p>
-                  </a:txBody>
-                  <a:tcPr/>
-                </a:tc>
-                <a:extLst>
-                  <a:ext uri="{0D108BD9-81ED-4DB2-BD59-A6C34878D82A}">
-                    <a16:rowId xmlns:a16="http://schemas.microsoft.com/office/drawing/2014/main" val="437626592"/>
-                  </a:ext>
-                </a:extLst>
-              </a:tr>
-            </a:tbl>
-          </a:graphicData>
-        </a:graphic>
-      </p:graphicFrame>
     </p:spTree>
     <p:extLst>
       <p:ext uri="{BB962C8B-B14F-4D97-AF65-F5344CB8AC3E}">
-        <p14:creationId xmlns:p14="http://schemas.microsoft.com/office/powerpoint/2010/main" val="458500098"/>
+        <p14:creationId xmlns:p14="http://schemas.microsoft.com/office/powerpoint/2010/main" val="437852254"/>
       </p:ext>
     </p:extLst>
   </p:cSld>
@@ -17154,753 +16918,6 @@
 </file>
 
 <file path=ppt/slides/slide16.xml><?xml version="1.0" encoding="utf-8"?>
-<p:sld xmlns:a="http://schemas.openxmlformats.org/drawingml/2006/main" xmlns:r="http://schemas.openxmlformats.org/officeDocument/2006/relationships" xmlns:p="http://schemas.openxmlformats.org/presentationml/2006/main">
-  <p:cSld>
-    <p:spTree>
-      <p:nvGrpSpPr>
-        <p:cNvPr id="1" name="">
-          <a:extLst>
-            <a:ext uri="{FF2B5EF4-FFF2-40B4-BE49-F238E27FC236}">
-              <a16:creationId xmlns:a16="http://schemas.microsoft.com/office/drawing/2014/main" id="{ADF4A860-27FC-B168-9388-3CC317887DD6}"/>
-            </a:ext>
-          </a:extLst>
-        </p:cNvPr>
-        <p:cNvGrpSpPr/>
-        <p:nvPr/>
-      </p:nvGrpSpPr>
-      <p:grpSpPr>
-        <a:xfrm>
-          <a:off x="0" y="0"/>
-          <a:ext cx="0" cy="0"/>
-          <a:chOff x="0" y="0"/>
-          <a:chExt cx="0" cy="0"/>
-        </a:xfrm>
-      </p:grpSpPr>
-      <p:sp>
-        <p:nvSpPr>
-          <p:cNvPr id="2" name="Title 1">
-            <a:extLst>
-              <a:ext uri="{FF2B5EF4-FFF2-40B4-BE49-F238E27FC236}">
-                <a16:creationId xmlns:a16="http://schemas.microsoft.com/office/drawing/2014/main" id="{A32BC26A-22C1-5E12-79BD-41557AC51CDF}"/>
-              </a:ext>
-            </a:extLst>
-          </p:cNvPr>
-          <p:cNvSpPr>
-            <a:spLocks noGrp="1"/>
-          </p:cNvSpPr>
-          <p:nvPr>
-            <p:ph type="title"/>
-          </p:nvPr>
-        </p:nvSpPr>
-        <p:spPr>
-          <a:xfrm>
-            <a:off x="1885156" y="72991"/>
-            <a:ext cx="8421688" cy="1325563"/>
-          </a:xfrm>
-        </p:spPr>
-        <p:txBody>
-          <a:bodyPr/>
-          <a:lstStyle/>
-          <a:p>
-            <a:r>
-              <a:rPr lang="en-US" dirty="0"/>
-              <a:t>SVM Performance</a:t>
-            </a:r>
-          </a:p>
-        </p:txBody>
-      </p:sp>
-      <p:graphicFrame>
-        <p:nvGraphicFramePr>
-          <p:cNvPr id="10" name="Table 9">
-            <a:extLst>
-              <a:ext uri="{FF2B5EF4-FFF2-40B4-BE49-F238E27FC236}">
-                <a16:creationId xmlns:a16="http://schemas.microsoft.com/office/drawing/2014/main" id="{8F863F8C-AAAE-ED32-DD80-E90477993995}"/>
-              </a:ext>
-            </a:extLst>
-          </p:cNvPr>
-          <p:cNvGraphicFramePr>
-            <a:graphicFrameLocks noGrp="1"/>
-          </p:cNvGraphicFramePr>
-          <p:nvPr>
-            <p:extLst>
-              <p:ext uri="{D42A27DB-BD31-4B8C-83A1-F6EECF244321}">
-                <p14:modId xmlns:p14="http://schemas.microsoft.com/office/powerpoint/2010/main" val="3689758918"/>
-              </p:ext>
-            </p:extLst>
-          </p:nvPr>
-        </p:nvGraphicFramePr>
-        <p:xfrm>
-          <a:off x="393324" y="2494357"/>
-          <a:ext cx="4471398" cy="1869284"/>
-        </p:xfrm>
-        <a:graphic>
-          <a:graphicData uri="http://schemas.openxmlformats.org/drawingml/2006/table">
-            <a:tbl>
-              <a:tblPr firstRow="1" bandRow="1">
-                <a:tableStyleId>{5940675A-B579-460E-94D1-54222C63F5DA}</a:tableStyleId>
-              </a:tblPr>
-              <a:tblGrid>
-                <a:gridCol w="1490466">
-                  <a:extLst>
-                    <a:ext uri="{9D8B030D-6E8A-4147-A177-3AD203B41FA5}">
-                      <a16:colId xmlns:a16="http://schemas.microsoft.com/office/drawing/2014/main" val="1401693986"/>
-                    </a:ext>
-                  </a:extLst>
-                </a:gridCol>
-                <a:gridCol w="1490466">
-                  <a:extLst>
-                    <a:ext uri="{9D8B030D-6E8A-4147-A177-3AD203B41FA5}">
-                      <a16:colId xmlns:a16="http://schemas.microsoft.com/office/drawing/2014/main" val="3909165591"/>
-                    </a:ext>
-                  </a:extLst>
-                </a:gridCol>
-                <a:gridCol w="1490466">
-                  <a:extLst>
-                    <a:ext uri="{9D8B030D-6E8A-4147-A177-3AD203B41FA5}">
-                      <a16:colId xmlns:a16="http://schemas.microsoft.com/office/drawing/2014/main" val="1379050625"/>
-                    </a:ext>
-                  </a:extLst>
-                </a:gridCol>
-              </a:tblGrid>
-              <a:tr h="934642">
-                <a:tc>
-                  <a:txBody>
-                    <a:bodyPr/>
-                    <a:lstStyle/>
-                    <a:p>
-                      <a:endParaRPr lang="en-US" dirty="0"/>
-                    </a:p>
-                  </a:txBody>
-                  <a:tcPr/>
-                </a:tc>
-                <a:tc>
-                  <a:txBody>
-                    <a:bodyPr/>
-                    <a:lstStyle/>
-                    <a:p>
-                      <a:r>
-                        <a:rPr lang="en-US" dirty="0"/>
-                        <a:t>RMSE</a:t>
-                      </a:r>
-                    </a:p>
-                  </a:txBody>
-                  <a:tcPr/>
-                </a:tc>
-                <a:tc>
-                  <a:txBody>
-                    <a:bodyPr/>
-                    <a:lstStyle/>
-                    <a:p>
-                      <a:r>
-                        <a:rPr lang="en-US" dirty="0"/>
-                        <a:t>R</a:t>
-                      </a:r>
-                      <a:r>
-                        <a:rPr lang="en-US" baseline="30000" dirty="0"/>
-                        <a:t>2</a:t>
-                      </a:r>
-                    </a:p>
-                  </a:txBody>
-                  <a:tcPr/>
-                </a:tc>
-                <a:extLst>
-                  <a:ext uri="{0D108BD9-81ED-4DB2-BD59-A6C34878D82A}">
-                    <a16:rowId xmlns:a16="http://schemas.microsoft.com/office/drawing/2014/main" val="657843193"/>
-                  </a:ext>
-                </a:extLst>
-              </a:tr>
-              <a:tr h="934642">
-                <a:tc>
-                  <a:txBody>
-                    <a:bodyPr/>
-                    <a:lstStyle/>
-                    <a:p>
-                      <a:r>
-                        <a:rPr lang="en-US" dirty="0"/>
-                        <a:t>SVM</a:t>
-                      </a:r>
-                    </a:p>
-                  </a:txBody>
-                  <a:tcPr/>
-                </a:tc>
-                <a:tc>
-                  <a:txBody>
-                    <a:bodyPr/>
-                    <a:lstStyle/>
-                    <a:p>
-                      <a:r>
-                        <a:rPr lang="en-US" dirty="0"/>
-                        <a:t>99.432</a:t>
-                      </a:r>
-                    </a:p>
-                  </a:txBody>
-                  <a:tcPr/>
-                </a:tc>
-                <a:tc>
-                  <a:txBody>
-                    <a:bodyPr/>
-                    <a:lstStyle/>
-                    <a:p>
-                      <a:r>
-                        <a:rPr lang="en-US" dirty="0"/>
-                        <a:t>0.695</a:t>
-                      </a:r>
-                    </a:p>
-                  </a:txBody>
-                  <a:tcPr/>
-                </a:tc>
-                <a:extLst>
-                  <a:ext uri="{0D108BD9-81ED-4DB2-BD59-A6C34878D82A}">
-                    <a16:rowId xmlns:a16="http://schemas.microsoft.com/office/drawing/2014/main" val="3090176616"/>
-                  </a:ext>
-                </a:extLst>
-              </a:tr>
-            </a:tbl>
-          </a:graphicData>
-        </a:graphic>
-      </p:graphicFrame>
-      <p:pic>
-        <p:nvPicPr>
-          <p:cNvPr id="5" name="Picture 4" descr="A graph showing a plot of values&#10;&#10;Description automatically generated with medium confidence">
-            <a:extLst>
-              <a:ext uri="{FF2B5EF4-FFF2-40B4-BE49-F238E27FC236}">
-                <a16:creationId xmlns:a16="http://schemas.microsoft.com/office/drawing/2014/main" id="{4BD5D58C-5A99-3F54-3BDE-D36709BAF10D}"/>
-              </a:ext>
-            </a:extLst>
-          </p:cNvPr>
-          <p:cNvPicPr>
-            <a:picLocks noChangeAspect="1"/>
-          </p:cNvPicPr>
-          <p:nvPr/>
-        </p:nvPicPr>
-        <p:blipFill>
-          <a:blip r:embed="rId2"/>
-          <a:stretch>
-            <a:fillRect/>
-          </a:stretch>
-        </p:blipFill>
-        <p:spPr>
-          <a:xfrm>
-            <a:off x="6239038" y="1234435"/>
-            <a:ext cx="5852172" cy="4389129"/>
-          </a:xfrm>
-          <a:prstGeom prst="rect">
-            <a:avLst/>
-          </a:prstGeom>
-        </p:spPr>
-      </p:pic>
-    </p:spTree>
-    <p:extLst>
-      <p:ext uri="{BB962C8B-B14F-4D97-AF65-F5344CB8AC3E}">
-        <p14:creationId xmlns:p14="http://schemas.microsoft.com/office/powerpoint/2010/main" val="3512051203"/>
-      </p:ext>
-    </p:extLst>
-  </p:cSld>
-  <p:clrMapOvr>
-    <a:masterClrMapping/>
-  </p:clrMapOvr>
-</p:sld>
-</file>
-
-<file path=ppt/slides/slide17.xml><?xml version="1.0" encoding="utf-8"?>
-<p:sld xmlns:a="http://schemas.openxmlformats.org/drawingml/2006/main" xmlns:r="http://schemas.openxmlformats.org/officeDocument/2006/relationships" xmlns:p="http://schemas.openxmlformats.org/presentationml/2006/main">
-  <p:cSld>
-    <p:spTree>
-      <p:nvGrpSpPr>
-        <p:cNvPr id="1" name="">
-          <a:extLst>
-            <a:ext uri="{FF2B5EF4-FFF2-40B4-BE49-F238E27FC236}">
-              <a16:creationId xmlns:a16="http://schemas.microsoft.com/office/drawing/2014/main" id="{6CE3A5AA-56D1-04AE-6D63-6B38FA1CBC41}"/>
-            </a:ext>
-          </a:extLst>
-        </p:cNvPr>
-        <p:cNvGrpSpPr/>
-        <p:nvPr/>
-      </p:nvGrpSpPr>
-      <p:grpSpPr>
-        <a:xfrm>
-          <a:off x="0" y="0"/>
-          <a:ext cx="0" cy="0"/>
-          <a:chOff x="0" y="0"/>
-          <a:chExt cx="0" cy="0"/>
-        </a:xfrm>
-      </p:grpSpPr>
-      <p:sp>
-        <p:nvSpPr>
-          <p:cNvPr id="2" name="Title 1">
-            <a:extLst>
-              <a:ext uri="{FF2B5EF4-FFF2-40B4-BE49-F238E27FC236}">
-                <a16:creationId xmlns:a16="http://schemas.microsoft.com/office/drawing/2014/main" id="{66E8BFB0-8623-2E80-3BE2-D29ADBEAC84E}"/>
-              </a:ext>
-            </a:extLst>
-          </p:cNvPr>
-          <p:cNvSpPr>
-            <a:spLocks noGrp="1"/>
-          </p:cNvSpPr>
-          <p:nvPr>
-            <p:ph type="title"/>
-          </p:nvPr>
-        </p:nvSpPr>
-        <p:spPr>
-          <a:xfrm>
-            <a:off x="1885156" y="72991"/>
-            <a:ext cx="8421688" cy="1325563"/>
-          </a:xfrm>
-        </p:spPr>
-        <p:txBody>
-          <a:bodyPr/>
-          <a:lstStyle/>
-          <a:p>
-            <a:r>
-              <a:rPr lang="en-US" dirty="0"/>
-              <a:t>Random forest performance</a:t>
-            </a:r>
-          </a:p>
-        </p:txBody>
-      </p:sp>
-      <p:graphicFrame>
-        <p:nvGraphicFramePr>
-          <p:cNvPr id="10" name="Table 9">
-            <a:extLst>
-              <a:ext uri="{FF2B5EF4-FFF2-40B4-BE49-F238E27FC236}">
-                <a16:creationId xmlns:a16="http://schemas.microsoft.com/office/drawing/2014/main" id="{4C501B8E-CD07-6C37-8ADD-F662787C00FE}"/>
-              </a:ext>
-            </a:extLst>
-          </p:cNvPr>
-          <p:cNvGraphicFramePr>
-            <a:graphicFrameLocks noGrp="1"/>
-          </p:cNvGraphicFramePr>
-          <p:nvPr>
-            <p:extLst>
-              <p:ext uri="{D42A27DB-BD31-4B8C-83A1-F6EECF244321}">
-                <p14:modId xmlns:p14="http://schemas.microsoft.com/office/powerpoint/2010/main" val="1778610433"/>
-              </p:ext>
-            </p:extLst>
-          </p:nvPr>
-        </p:nvGraphicFramePr>
-        <p:xfrm>
-          <a:off x="393324" y="2494357"/>
-          <a:ext cx="4471398" cy="1869284"/>
-        </p:xfrm>
-        <a:graphic>
-          <a:graphicData uri="http://schemas.openxmlformats.org/drawingml/2006/table">
-            <a:tbl>
-              <a:tblPr firstRow="1" bandRow="1">
-                <a:tableStyleId>{5940675A-B579-460E-94D1-54222C63F5DA}</a:tableStyleId>
-              </a:tblPr>
-              <a:tblGrid>
-                <a:gridCol w="1490466">
-                  <a:extLst>
-                    <a:ext uri="{9D8B030D-6E8A-4147-A177-3AD203B41FA5}">
-                      <a16:colId xmlns:a16="http://schemas.microsoft.com/office/drawing/2014/main" val="1401693986"/>
-                    </a:ext>
-                  </a:extLst>
-                </a:gridCol>
-                <a:gridCol w="1490466">
-                  <a:extLst>
-                    <a:ext uri="{9D8B030D-6E8A-4147-A177-3AD203B41FA5}">
-                      <a16:colId xmlns:a16="http://schemas.microsoft.com/office/drawing/2014/main" val="3909165591"/>
-                    </a:ext>
-                  </a:extLst>
-                </a:gridCol>
-                <a:gridCol w="1490466">
-                  <a:extLst>
-                    <a:ext uri="{9D8B030D-6E8A-4147-A177-3AD203B41FA5}">
-                      <a16:colId xmlns:a16="http://schemas.microsoft.com/office/drawing/2014/main" val="1379050625"/>
-                    </a:ext>
-                  </a:extLst>
-                </a:gridCol>
-              </a:tblGrid>
-              <a:tr h="934642">
-                <a:tc>
-                  <a:txBody>
-                    <a:bodyPr/>
-                    <a:lstStyle/>
-                    <a:p>
-                      <a:endParaRPr lang="en-US" dirty="0"/>
-                    </a:p>
-                  </a:txBody>
-                  <a:tcPr/>
-                </a:tc>
-                <a:tc>
-                  <a:txBody>
-                    <a:bodyPr/>
-                    <a:lstStyle/>
-                    <a:p>
-                      <a:r>
-                        <a:rPr lang="en-US" dirty="0"/>
-                        <a:t>RMSE</a:t>
-                      </a:r>
-                    </a:p>
-                  </a:txBody>
-                  <a:tcPr/>
-                </a:tc>
-                <a:tc>
-                  <a:txBody>
-                    <a:bodyPr/>
-                    <a:lstStyle/>
-                    <a:p>
-                      <a:r>
-                        <a:rPr lang="en-US" dirty="0"/>
-                        <a:t>R</a:t>
-                      </a:r>
-                      <a:r>
-                        <a:rPr lang="en-US" baseline="30000" dirty="0"/>
-                        <a:t>2</a:t>
-                      </a:r>
-                    </a:p>
-                  </a:txBody>
-                  <a:tcPr/>
-                </a:tc>
-                <a:extLst>
-                  <a:ext uri="{0D108BD9-81ED-4DB2-BD59-A6C34878D82A}">
-                    <a16:rowId xmlns:a16="http://schemas.microsoft.com/office/drawing/2014/main" val="657843193"/>
-                  </a:ext>
-                </a:extLst>
-              </a:tr>
-              <a:tr h="934642">
-                <a:tc>
-                  <a:txBody>
-                    <a:bodyPr/>
-                    <a:lstStyle/>
-                    <a:p>
-                      <a:r>
-                        <a:rPr lang="en-US" dirty="0"/>
-                        <a:t>Random Forest</a:t>
-                      </a:r>
-                    </a:p>
-                  </a:txBody>
-                  <a:tcPr/>
-                </a:tc>
-                <a:tc>
-                  <a:txBody>
-                    <a:bodyPr/>
-                    <a:lstStyle/>
-                    <a:p>
-                      <a:r>
-                        <a:rPr lang="en-US" dirty="0"/>
-                        <a:t>47.818</a:t>
-                      </a:r>
-                    </a:p>
-                  </a:txBody>
-                  <a:tcPr/>
-                </a:tc>
-                <a:tc>
-                  <a:txBody>
-                    <a:bodyPr/>
-                    <a:lstStyle/>
-                    <a:p>
-                      <a:r>
-                        <a:rPr lang="en-US" dirty="0"/>
-                        <a:t>0.930</a:t>
-                      </a:r>
-                    </a:p>
-                  </a:txBody>
-                  <a:tcPr/>
-                </a:tc>
-                <a:extLst>
-                  <a:ext uri="{0D108BD9-81ED-4DB2-BD59-A6C34878D82A}">
-                    <a16:rowId xmlns:a16="http://schemas.microsoft.com/office/drawing/2014/main" val="3090176616"/>
-                  </a:ext>
-                </a:extLst>
-              </a:tr>
-            </a:tbl>
-          </a:graphicData>
-        </a:graphic>
-      </p:graphicFrame>
-      <p:pic>
-        <p:nvPicPr>
-          <p:cNvPr id="4" name="Picture 3" descr="A graph showing a plot of a forest&#10;&#10;Description automatically generated with medium confidence">
-            <a:extLst>
-              <a:ext uri="{FF2B5EF4-FFF2-40B4-BE49-F238E27FC236}">
-                <a16:creationId xmlns:a16="http://schemas.microsoft.com/office/drawing/2014/main" id="{5270BD96-A455-5518-09F9-CEA6B17468B9}"/>
-              </a:ext>
-            </a:extLst>
-          </p:cNvPr>
-          <p:cNvPicPr>
-            <a:picLocks noChangeAspect="1"/>
-          </p:cNvPicPr>
-          <p:nvPr/>
-        </p:nvPicPr>
-        <p:blipFill>
-          <a:blip r:embed="rId2"/>
-          <a:stretch>
-            <a:fillRect/>
-          </a:stretch>
-        </p:blipFill>
-        <p:spPr>
-          <a:xfrm>
-            <a:off x="5813520" y="1234435"/>
-            <a:ext cx="5852172" cy="4389129"/>
-          </a:xfrm>
-          <a:prstGeom prst="rect">
-            <a:avLst/>
-          </a:prstGeom>
-        </p:spPr>
-      </p:pic>
-    </p:spTree>
-    <p:extLst>
-      <p:ext uri="{BB962C8B-B14F-4D97-AF65-F5344CB8AC3E}">
-        <p14:creationId xmlns:p14="http://schemas.microsoft.com/office/powerpoint/2010/main" val="3328422825"/>
-      </p:ext>
-    </p:extLst>
-  </p:cSld>
-  <p:clrMapOvr>
-    <a:masterClrMapping/>
-  </p:clrMapOvr>
-</p:sld>
-</file>
-
-<file path=ppt/slides/slide18.xml><?xml version="1.0" encoding="utf-8"?>
-<p:sld xmlns:a="http://schemas.openxmlformats.org/drawingml/2006/main" xmlns:r="http://schemas.openxmlformats.org/officeDocument/2006/relationships" xmlns:p="http://schemas.openxmlformats.org/presentationml/2006/main">
-  <p:cSld>
-    <p:spTree>
-      <p:nvGrpSpPr>
-        <p:cNvPr id="1" name="">
-          <a:extLst>
-            <a:ext uri="{FF2B5EF4-FFF2-40B4-BE49-F238E27FC236}">
-              <a16:creationId xmlns:a16="http://schemas.microsoft.com/office/drawing/2014/main" id="{91429702-65A0-8121-76B8-A2EEDA7908A6}"/>
-            </a:ext>
-          </a:extLst>
-        </p:cNvPr>
-        <p:cNvGrpSpPr/>
-        <p:nvPr/>
-      </p:nvGrpSpPr>
-      <p:grpSpPr>
-        <a:xfrm>
-          <a:off x="0" y="0"/>
-          <a:ext cx="0" cy="0"/>
-          <a:chOff x="0" y="0"/>
-          <a:chExt cx="0" cy="0"/>
-        </a:xfrm>
-      </p:grpSpPr>
-      <p:sp>
-        <p:nvSpPr>
-          <p:cNvPr id="2" name="Title 1">
-            <a:extLst>
-              <a:ext uri="{FF2B5EF4-FFF2-40B4-BE49-F238E27FC236}">
-                <a16:creationId xmlns:a16="http://schemas.microsoft.com/office/drawing/2014/main" id="{320B8753-BE5C-E042-BB11-6E0A31205AED}"/>
-              </a:ext>
-            </a:extLst>
-          </p:cNvPr>
-          <p:cNvSpPr>
-            <a:spLocks noGrp="1"/>
-          </p:cNvSpPr>
-          <p:nvPr>
-            <p:ph type="title"/>
-          </p:nvPr>
-        </p:nvSpPr>
-        <p:spPr>
-          <a:xfrm>
-            <a:off x="1885156" y="72991"/>
-            <a:ext cx="8421688" cy="1325563"/>
-          </a:xfrm>
-        </p:spPr>
-        <p:txBody>
-          <a:bodyPr/>
-          <a:lstStyle/>
-          <a:p>
-            <a:r>
-              <a:rPr lang="en-US" dirty="0"/>
-              <a:t>Neural network performance</a:t>
-            </a:r>
-          </a:p>
-        </p:txBody>
-      </p:sp>
-      <p:graphicFrame>
-        <p:nvGraphicFramePr>
-          <p:cNvPr id="10" name="Table 9">
-            <a:extLst>
-              <a:ext uri="{FF2B5EF4-FFF2-40B4-BE49-F238E27FC236}">
-                <a16:creationId xmlns:a16="http://schemas.microsoft.com/office/drawing/2014/main" id="{F6554699-5902-B91D-8D35-B8345C653E00}"/>
-              </a:ext>
-            </a:extLst>
-          </p:cNvPr>
-          <p:cNvGraphicFramePr>
-            <a:graphicFrameLocks noGrp="1"/>
-          </p:cNvGraphicFramePr>
-          <p:nvPr>
-            <p:extLst>
-              <p:ext uri="{D42A27DB-BD31-4B8C-83A1-F6EECF244321}">
-                <p14:modId xmlns:p14="http://schemas.microsoft.com/office/powerpoint/2010/main" val="2318255804"/>
-              </p:ext>
-            </p:extLst>
-          </p:nvPr>
-        </p:nvGraphicFramePr>
-        <p:xfrm>
-          <a:off x="393324" y="2494357"/>
-          <a:ext cx="4471398" cy="1869284"/>
-        </p:xfrm>
-        <a:graphic>
-          <a:graphicData uri="http://schemas.openxmlformats.org/drawingml/2006/table">
-            <a:tbl>
-              <a:tblPr firstRow="1" bandRow="1">
-                <a:tableStyleId>{5940675A-B579-460E-94D1-54222C63F5DA}</a:tableStyleId>
-              </a:tblPr>
-              <a:tblGrid>
-                <a:gridCol w="1490466">
-                  <a:extLst>
-                    <a:ext uri="{9D8B030D-6E8A-4147-A177-3AD203B41FA5}">
-                      <a16:colId xmlns:a16="http://schemas.microsoft.com/office/drawing/2014/main" val="1401693986"/>
-                    </a:ext>
-                  </a:extLst>
-                </a:gridCol>
-                <a:gridCol w="1490466">
-                  <a:extLst>
-                    <a:ext uri="{9D8B030D-6E8A-4147-A177-3AD203B41FA5}">
-                      <a16:colId xmlns:a16="http://schemas.microsoft.com/office/drawing/2014/main" val="3909165591"/>
-                    </a:ext>
-                  </a:extLst>
-                </a:gridCol>
-                <a:gridCol w="1490466">
-                  <a:extLst>
-                    <a:ext uri="{9D8B030D-6E8A-4147-A177-3AD203B41FA5}">
-                      <a16:colId xmlns:a16="http://schemas.microsoft.com/office/drawing/2014/main" val="1379050625"/>
-                    </a:ext>
-                  </a:extLst>
-                </a:gridCol>
-              </a:tblGrid>
-              <a:tr h="934642">
-                <a:tc>
-                  <a:txBody>
-                    <a:bodyPr/>
-                    <a:lstStyle/>
-                    <a:p>
-                      <a:endParaRPr lang="en-US" dirty="0"/>
-                    </a:p>
-                  </a:txBody>
-                  <a:tcPr/>
-                </a:tc>
-                <a:tc>
-                  <a:txBody>
-                    <a:bodyPr/>
-                    <a:lstStyle/>
-                    <a:p>
-                      <a:r>
-                        <a:rPr lang="en-US" dirty="0"/>
-                        <a:t>RMSE</a:t>
-                      </a:r>
-                    </a:p>
-                  </a:txBody>
-                  <a:tcPr/>
-                </a:tc>
-                <a:tc>
-                  <a:txBody>
-                    <a:bodyPr/>
-                    <a:lstStyle/>
-                    <a:p>
-                      <a:r>
-                        <a:rPr lang="en-US" dirty="0"/>
-                        <a:t>R</a:t>
-                      </a:r>
-                      <a:r>
-                        <a:rPr lang="en-US" baseline="30000" dirty="0"/>
-                        <a:t>2</a:t>
-                      </a:r>
-                    </a:p>
-                  </a:txBody>
-                  <a:tcPr/>
-                </a:tc>
-                <a:extLst>
-                  <a:ext uri="{0D108BD9-81ED-4DB2-BD59-A6C34878D82A}">
-                    <a16:rowId xmlns:a16="http://schemas.microsoft.com/office/drawing/2014/main" val="657843193"/>
-                  </a:ext>
-                </a:extLst>
-              </a:tr>
-              <a:tr h="934642">
-                <a:tc>
-                  <a:txBody>
-                    <a:bodyPr/>
-                    <a:lstStyle/>
-                    <a:p>
-                      <a:r>
-                        <a:rPr lang="en-US" dirty="0"/>
-                        <a:t>Neural Network</a:t>
-                      </a:r>
-                    </a:p>
-                  </a:txBody>
-                  <a:tcPr/>
-                </a:tc>
-                <a:tc>
-                  <a:txBody>
-                    <a:bodyPr/>
-                    <a:lstStyle/>
-                    <a:p>
-                      <a:r>
-                        <a:rPr lang="en-US" dirty="0"/>
-                        <a:t>43.843</a:t>
-                      </a:r>
-                    </a:p>
-                  </a:txBody>
-                  <a:tcPr/>
-                </a:tc>
-                <a:tc>
-                  <a:txBody>
-                    <a:bodyPr/>
-                    <a:lstStyle/>
-                    <a:p>
-                      <a:r>
-                        <a:rPr lang="en-US" dirty="0"/>
-                        <a:t>0.940</a:t>
-                      </a:r>
-                    </a:p>
-                  </a:txBody>
-                  <a:tcPr/>
-                </a:tc>
-                <a:extLst>
-                  <a:ext uri="{0D108BD9-81ED-4DB2-BD59-A6C34878D82A}">
-                    <a16:rowId xmlns:a16="http://schemas.microsoft.com/office/drawing/2014/main" val="3090176616"/>
-                  </a:ext>
-                </a:extLst>
-              </a:tr>
-            </a:tbl>
-          </a:graphicData>
-        </a:graphic>
-      </p:graphicFrame>
-      <p:pic>
-        <p:nvPicPr>
-          <p:cNvPr id="5" name="Picture 4" descr="A graph showing a plot of residuals&#10;&#10;Description automatically generated with medium confidence">
-            <a:extLst>
-              <a:ext uri="{FF2B5EF4-FFF2-40B4-BE49-F238E27FC236}">
-                <a16:creationId xmlns:a16="http://schemas.microsoft.com/office/drawing/2014/main" id="{B639FE99-457D-9DDA-7836-A7038348EA22}"/>
-              </a:ext>
-            </a:extLst>
-          </p:cNvPr>
-          <p:cNvPicPr>
-            <a:picLocks noChangeAspect="1"/>
-          </p:cNvPicPr>
-          <p:nvPr/>
-        </p:nvPicPr>
-        <p:blipFill>
-          <a:blip r:embed="rId2"/>
-          <a:stretch>
-            <a:fillRect/>
-          </a:stretch>
-        </p:blipFill>
-        <p:spPr>
-          <a:xfrm>
-            <a:off x="5946504" y="1234434"/>
-            <a:ext cx="5852172" cy="4389129"/>
-          </a:xfrm>
-          <a:prstGeom prst="rect">
-            <a:avLst/>
-          </a:prstGeom>
-        </p:spPr>
-      </p:pic>
-    </p:spTree>
-    <p:extLst>
-      <p:ext uri="{BB962C8B-B14F-4D97-AF65-F5344CB8AC3E}">
-        <p14:creationId xmlns:p14="http://schemas.microsoft.com/office/powerpoint/2010/main" val="1044058584"/>
-      </p:ext>
-    </p:extLst>
-  </p:cSld>
-  <p:clrMapOvr>
-    <a:masterClrMapping/>
-  </p:clrMapOvr>
-</p:sld>
-</file>
-
-<file path=ppt/slides/slide19.xml><?xml version="1.0" encoding="utf-8"?>
 <p:sld xmlns:a="http://schemas.openxmlformats.org/drawingml/2006/main" xmlns:r="http://schemas.openxmlformats.org/officeDocument/2006/relationships" xmlns:p="http://schemas.openxmlformats.org/presentationml/2006/main">
   <p:cSld>
     <p:spTree>
@@ -17990,6 +17007,443 @@
     <p:extLst>
       <p:ext uri="{BB962C8B-B14F-4D97-AF65-F5344CB8AC3E}">
         <p14:creationId xmlns:p14="http://schemas.microsoft.com/office/powerpoint/2010/main" val="3801367119"/>
+      </p:ext>
+    </p:extLst>
+  </p:cSld>
+  <p:clrMapOvr>
+    <a:masterClrMapping/>
+  </p:clrMapOvr>
+</p:sld>
+</file>
+
+<file path=ppt/slides/slide17.xml><?xml version="1.0" encoding="utf-8"?>
+<p:sld xmlns:a="http://schemas.openxmlformats.org/drawingml/2006/main" xmlns:r="http://schemas.openxmlformats.org/officeDocument/2006/relationships" xmlns:p="http://schemas.openxmlformats.org/presentationml/2006/main">
+  <p:cSld>
+    <p:spTree>
+      <p:nvGrpSpPr>
+        <p:cNvPr id="1" name="">
+          <a:extLst>
+            <a:ext uri="{FF2B5EF4-FFF2-40B4-BE49-F238E27FC236}">
+              <a16:creationId xmlns:a16="http://schemas.microsoft.com/office/drawing/2014/main" id="{9064DC4A-42C7-9B0D-59F8-4635535717D3}"/>
+            </a:ext>
+          </a:extLst>
+        </p:cNvPr>
+        <p:cNvGrpSpPr/>
+        <p:nvPr/>
+      </p:nvGrpSpPr>
+      <p:grpSpPr>
+        <a:xfrm>
+          <a:off x="0" y="0"/>
+          <a:ext cx="0" cy="0"/>
+          <a:chOff x="0" y="0"/>
+          <a:chExt cx="0" cy="0"/>
+        </a:xfrm>
+      </p:grpSpPr>
+      <p:sp>
+        <p:nvSpPr>
+          <p:cNvPr id="2" name="Title 1">
+            <a:extLst>
+              <a:ext uri="{FF2B5EF4-FFF2-40B4-BE49-F238E27FC236}">
+                <a16:creationId xmlns:a16="http://schemas.microsoft.com/office/drawing/2014/main" id="{461369C7-AF07-7382-6E12-953A1F8DE6AE}"/>
+              </a:ext>
+            </a:extLst>
+          </p:cNvPr>
+          <p:cNvSpPr>
+            <a:spLocks noGrp="1"/>
+          </p:cNvSpPr>
+          <p:nvPr>
+            <p:ph type="ctrTitle"/>
+          </p:nvPr>
+        </p:nvSpPr>
+        <p:spPr>
+          <a:xfrm>
+            <a:off x="6991350" y="2571235"/>
+            <a:ext cx="4179570" cy="1715531"/>
+          </a:xfrm>
+        </p:spPr>
+        <p:txBody>
+          <a:bodyPr/>
+          <a:lstStyle/>
+          <a:p>
+            <a:r>
+              <a:rPr lang="en-GB" dirty="0"/>
+              <a:t>Another task completed</a:t>
+            </a:r>
+            <a:endParaRPr lang="en-US" dirty="0"/>
+          </a:p>
+        </p:txBody>
+      </p:sp>
+    </p:spTree>
+    <p:extLst>
+      <p:ext uri="{BB962C8B-B14F-4D97-AF65-F5344CB8AC3E}">
+        <p14:creationId xmlns:p14="http://schemas.microsoft.com/office/powerpoint/2010/main" val="2870448881"/>
+      </p:ext>
+    </p:extLst>
+  </p:cSld>
+  <p:clrMapOvr>
+    <a:masterClrMapping/>
+  </p:clrMapOvr>
+</p:sld>
+</file>
+
+<file path=ppt/slides/slide18.xml><?xml version="1.0" encoding="utf-8"?>
+<p:sld xmlns:a="http://schemas.openxmlformats.org/drawingml/2006/main" xmlns:r="http://schemas.openxmlformats.org/officeDocument/2006/relationships" xmlns:p="http://schemas.openxmlformats.org/presentationml/2006/main">
+  <p:cSld>
+    <p:spTree>
+      <p:nvGrpSpPr>
+        <p:cNvPr id="1" name="">
+          <a:extLst>
+            <a:ext uri="{FF2B5EF4-FFF2-40B4-BE49-F238E27FC236}">
+              <a16:creationId xmlns:a16="http://schemas.microsoft.com/office/drawing/2014/main" id="{50E2CF96-046F-82F7-F6CE-9C496F6B3EA8}"/>
+            </a:ext>
+          </a:extLst>
+        </p:cNvPr>
+        <p:cNvGrpSpPr/>
+        <p:nvPr/>
+      </p:nvGrpSpPr>
+      <p:grpSpPr>
+        <a:xfrm>
+          <a:off x="0" y="0"/>
+          <a:ext cx="0" cy="0"/>
+          <a:chOff x="0" y="0"/>
+          <a:chExt cx="0" cy="0"/>
+        </a:xfrm>
+      </p:grpSpPr>
+      <p:sp>
+        <p:nvSpPr>
+          <p:cNvPr id="2" name="Title 1">
+            <a:extLst>
+              <a:ext uri="{FF2B5EF4-FFF2-40B4-BE49-F238E27FC236}">
+                <a16:creationId xmlns:a16="http://schemas.microsoft.com/office/drawing/2014/main" id="{A11AAEEE-55D5-B580-74EE-7BF6467805C1}"/>
+              </a:ext>
+            </a:extLst>
+          </p:cNvPr>
+          <p:cNvSpPr>
+            <a:spLocks noGrp="1"/>
+          </p:cNvSpPr>
+          <p:nvPr>
+            <p:ph type="title"/>
+          </p:nvPr>
+        </p:nvSpPr>
+        <p:spPr>
+          <a:xfrm>
+            <a:off x="1885156" y="72991"/>
+            <a:ext cx="8421688" cy="1325563"/>
+          </a:xfrm>
+        </p:spPr>
+        <p:txBody>
+          <a:bodyPr/>
+          <a:lstStyle/>
+          <a:p>
+            <a:r>
+              <a:rPr lang="en-US" dirty="0"/>
+              <a:t>Tasks completed</a:t>
+            </a:r>
+          </a:p>
+        </p:txBody>
+      </p:sp>
+      <p:sp>
+        <p:nvSpPr>
+          <p:cNvPr id="5" name="TextBox 4">
+            <a:extLst>
+              <a:ext uri="{FF2B5EF4-FFF2-40B4-BE49-F238E27FC236}">
+                <a16:creationId xmlns:a16="http://schemas.microsoft.com/office/drawing/2014/main" id="{DEF4904B-EB9F-84FA-93C0-6F41F423CB56}"/>
+              </a:ext>
+            </a:extLst>
+          </p:cNvPr>
+          <p:cNvSpPr txBox="1"/>
+          <p:nvPr/>
+        </p:nvSpPr>
+        <p:spPr>
+          <a:xfrm>
+            <a:off x="1276539" y="1665838"/>
+            <a:ext cx="5024673" cy="3139321"/>
+          </a:xfrm>
+          <a:prstGeom prst="rect">
+            <a:avLst/>
+          </a:prstGeom>
+          <a:noFill/>
+        </p:spPr>
+        <p:txBody>
+          <a:bodyPr wrap="square" rtlCol="0">
+            <a:spAutoFit/>
+          </a:bodyPr>
+          <a:lstStyle/>
+          <a:p>
+            <a:pPr marL="285750" indent="-285750">
+              <a:buFont typeface="Arial" panose="020B0604020202020204" pitchFamily="34" charset="0"/>
+              <a:buChar char="•"/>
+            </a:pPr>
+            <a:r>
+              <a:rPr lang="en-GB" dirty="0"/>
+              <a:t>mlcourse.ai lectures + assignments:</a:t>
+            </a:r>
+          </a:p>
+          <a:p>
+            <a:pPr marL="742950" lvl="1" indent="-285750">
+              <a:buFont typeface="Arial" panose="020B0604020202020204" pitchFamily="34" charset="0"/>
+              <a:buChar char="•"/>
+            </a:pPr>
+            <a:r>
+              <a:rPr lang="en-GB" dirty="0"/>
+              <a:t>Unsupervised Learning(DBSCAN)</a:t>
+            </a:r>
+          </a:p>
+          <a:p>
+            <a:pPr marL="742950" lvl="1" indent="-285750">
+              <a:buFont typeface="Arial" panose="020B0604020202020204" pitchFamily="34" charset="0"/>
+              <a:buChar char="•"/>
+            </a:pPr>
+            <a:r>
+              <a:rPr lang="en-GB" dirty="0"/>
+              <a:t>Feature Engineering + Feature Selection</a:t>
+            </a:r>
+          </a:p>
+          <a:p>
+            <a:pPr marL="742950" lvl="1" indent="-285750">
+              <a:buFont typeface="Arial" panose="020B0604020202020204" pitchFamily="34" charset="0"/>
+              <a:buChar char="•"/>
+            </a:pPr>
+            <a:r>
+              <a:rPr lang="en-GB" dirty="0"/>
+              <a:t>Regularization</a:t>
+            </a:r>
+          </a:p>
+          <a:p>
+            <a:pPr marL="742950" lvl="1" indent="-285750">
+              <a:buFont typeface="Arial" panose="020B0604020202020204" pitchFamily="34" charset="0"/>
+              <a:buChar char="•"/>
+            </a:pPr>
+            <a:r>
+              <a:rPr lang="en-GB" dirty="0"/>
+              <a:t>Time series</a:t>
+            </a:r>
+          </a:p>
+          <a:p>
+            <a:pPr marL="285750" indent="-285750">
+              <a:buFont typeface="Arial" panose="020B0604020202020204" pitchFamily="34" charset="0"/>
+              <a:buChar char="•"/>
+            </a:pPr>
+            <a:r>
+              <a:rPr lang="en-US" dirty="0"/>
+              <a:t>Deep learning courses:</a:t>
+            </a:r>
+          </a:p>
+          <a:p>
+            <a:pPr marL="742950" lvl="1" indent="-285750">
+              <a:buFont typeface="Arial" panose="020B0604020202020204" pitchFamily="34" charset="0"/>
+              <a:buChar char="•"/>
+            </a:pPr>
+            <a:r>
+              <a:rPr lang="en-US" dirty="0"/>
+              <a:t>RNN</a:t>
+            </a:r>
+          </a:p>
+          <a:p>
+            <a:pPr marL="742950" lvl="1" indent="-285750">
+              <a:buFont typeface="Arial" panose="020B0604020202020204" pitchFamily="34" charset="0"/>
+              <a:buChar char="•"/>
+            </a:pPr>
+            <a:r>
+              <a:rPr lang="en-US" dirty="0"/>
+              <a:t>LSTM</a:t>
+            </a:r>
+          </a:p>
+          <a:p>
+            <a:pPr marL="285750" indent="-285750">
+              <a:buFont typeface="Arial" panose="020B0604020202020204" pitchFamily="34" charset="0"/>
+              <a:buChar char="•"/>
+            </a:pPr>
+            <a:r>
+              <a:rPr lang="en-US" dirty="0"/>
+              <a:t>QQ plots</a:t>
+            </a:r>
+          </a:p>
+          <a:p>
+            <a:pPr marL="285750" indent="-285750">
+              <a:buFont typeface="Arial" panose="020B0604020202020204" pitchFamily="34" charset="0"/>
+              <a:buChar char="•"/>
+            </a:pPr>
+            <a:r>
+              <a:rPr lang="en-US" dirty="0"/>
+              <a:t>Loss function vs Cost function</a:t>
+            </a:r>
+          </a:p>
+          <a:p>
+            <a:pPr marL="285750" indent="-285750">
+              <a:buFont typeface="Arial" panose="020B0604020202020204" pitchFamily="34" charset="0"/>
+              <a:buChar char="•"/>
+            </a:pPr>
+            <a:r>
+              <a:rPr lang="en-US" dirty="0"/>
+              <a:t>Task from Olena’s project</a:t>
+            </a:r>
+          </a:p>
+        </p:txBody>
+      </p:sp>
+    </p:spTree>
+    <p:extLst>
+      <p:ext uri="{BB962C8B-B14F-4D97-AF65-F5344CB8AC3E}">
+        <p14:creationId xmlns:p14="http://schemas.microsoft.com/office/powerpoint/2010/main" val="2032807791"/>
+      </p:ext>
+    </p:extLst>
+  </p:cSld>
+  <p:clrMapOvr>
+    <a:masterClrMapping/>
+  </p:clrMapOvr>
+</p:sld>
+</file>
+
+<file path=ppt/slides/slide19.xml><?xml version="1.0" encoding="utf-8"?>
+<p:sld xmlns:a="http://schemas.openxmlformats.org/drawingml/2006/main" xmlns:r="http://schemas.openxmlformats.org/officeDocument/2006/relationships" xmlns:p="http://schemas.openxmlformats.org/presentationml/2006/main">
+  <p:cSld>
+    <p:spTree>
+      <p:nvGrpSpPr>
+        <p:cNvPr id="1" name="">
+          <a:extLst>
+            <a:ext uri="{FF2B5EF4-FFF2-40B4-BE49-F238E27FC236}">
+              <a16:creationId xmlns:a16="http://schemas.microsoft.com/office/drawing/2014/main" id="{D19FC8CD-296F-D826-264C-FD834488B098}"/>
+            </a:ext>
+          </a:extLst>
+        </p:cNvPr>
+        <p:cNvGrpSpPr/>
+        <p:nvPr/>
+      </p:nvGrpSpPr>
+      <p:grpSpPr>
+        <a:xfrm>
+          <a:off x="0" y="0"/>
+          <a:ext cx="0" cy="0"/>
+          <a:chOff x="0" y="0"/>
+          <a:chExt cx="0" cy="0"/>
+        </a:xfrm>
+      </p:grpSpPr>
+      <p:sp>
+        <p:nvSpPr>
+          <p:cNvPr id="2" name="Title 1">
+            <a:extLst>
+              <a:ext uri="{FF2B5EF4-FFF2-40B4-BE49-F238E27FC236}">
+                <a16:creationId xmlns:a16="http://schemas.microsoft.com/office/drawing/2014/main" id="{372D93B5-647B-53A4-2996-281666C6B639}"/>
+              </a:ext>
+            </a:extLst>
+          </p:cNvPr>
+          <p:cNvSpPr>
+            <a:spLocks noGrp="1"/>
+          </p:cNvSpPr>
+          <p:nvPr>
+            <p:ph type="title"/>
+          </p:nvPr>
+        </p:nvSpPr>
+        <p:spPr>
+          <a:xfrm>
+            <a:off x="1885156" y="72991"/>
+            <a:ext cx="8421688" cy="1325563"/>
+          </a:xfrm>
+        </p:spPr>
+        <p:txBody>
+          <a:bodyPr/>
+          <a:lstStyle/>
+          <a:p>
+            <a:r>
+              <a:rPr lang="en-US" dirty="0"/>
+              <a:t>Residual Plots(Linear Regression)</a:t>
+            </a:r>
+          </a:p>
+        </p:txBody>
+      </p:sp>
+      <p:pic>
+        <p:nvPicPr>
+          <p:cNvPr id="3" name="Picture 2" descr="A graph showing a plot of values&#10;&#10;Description automatically generated with medium confidence">
+            <a:extLst>
+              <a:ext uri="{FF2B5EF4-FFF2-40B4-BE49-F238E27FC236}">
+                <a16:creationId xmlns:a16="http://schemas.microsoft.com/office/drawing/2014/main" id="{4C269479-6FA8-FFAB-692D-8378621A0A68}"/>
+              </a:ext>
+            </a:extLst>
+          </p:cNvPr>
+          <p:cNvPicPr>
+            <a:picLocks noChangeAspect="1"/>
+          </p:cNvPicPr>
+          <p:nvPr/>
+        </p:nvPicPr>
+        <p:blipFill>
+          <a:blip r:embed="rId2"/>
+          <a:stretch>
+            <a:fillRect/>
+          </a:stretch>
+        </p:blipFill>
+        <p:spPr>
+          <a:xfrm>
+            <a:off x="0" y="2017790"/>
+            <a:ext cx="4052404" cy="3039303"/>
+          </a:xfrm>
+          <a:prstGeom prst="rect">
+            <a:avLst/>
+          </a:prstGeom>
+        </p:spPr>
+      </p:pic>
+      <p:pic>
+        <p:nvPicPr>
+          <p:cNvPr id="4" name="Picture 3" descr="A graph showing a plot of values&#10;&#10;Description automatically generated with medium confidence">
+            <a:extLst>
+              <a:ext uri="{FF2B5EF4-FFF2-40B4-BE49-F238E27FC236}">
+                <a16:creationId xmlns:a16="http://schemas.microsoft.com/office/drawing/2014/main" id="{DFB8D4DF-1A43-9716-0297-9F033FB09AD1}"/>
+              </a:ext>
+            </a:extLst>
+          </p:cNvPr>
+          <p:cNvPicPr>
+            <a:picLocks noChangeAspect="1"/>
+          </p:cNvPicPr>
+          <p:nvPr/>
+        </p:nvPicPr>
+        <p:blipFill>
+          <a:blip r:embed="rId3"/>
+          <a:stretch>
+            <a:fillRect/>
+          </a:stretch>
+        </p:blipFill>
+        <p:spPr>
+          <a:xfrm>
+            <a:off x="8104808" y="2017790"/>
+            <a:ext cx="4052403" cy="3039302"/>
+          </a:xfrm>
+          <a:prstGeom prst="rect">
+            <a:avLst/>
+          </a:prstGeom>
+        </p:spPr>
+      </p:pic>
+      <p:pic>
+        <p:nvPicPr>
+          <p:cNvPr id="6" name="Picture 5" descr="A graph showing a plot of values&#10;&#10;Description automatically generated">
+            <a:extLst>
+              <a:ext uri="{FF2B5EF4-FFF2-40B4-BE49-F238E27FC236}">
+                <a16:creationId xmlns:a16="http://schemas.microsoft.com/office/drawing/2014/main" id="{8A11D29E-2C6B-4F64-AAD0-40978F2117FD}"/>
+              </a:ext>
+            </a:extLst>
+          </p:cNvPr>
+          <p:cNvPicPr>
+            <a:picLocks noChangeAspect="1"/>
+          </p:cNvPicPr>
+          <p:nvPr/>
+        </p:nvPicPr>
+        <p:blipFill>
+          <a:blip r:embed="rId4"/>
+          <a:stretch>
+            <a:fillRect/>
+          </a:stretch>
+        </p:blipFill>
+        <p:spPr>
+          <a:xfrm>
+            <a:off x="4052404" y="2017789"/>
+            <a:ext cx="4052405" cy="3039303"/>
+          </a:xfrm>
+          <a:prstGeom prst="rect">
+            <a:avLst/>
+          </a:prstGeom>
+        </p:spPr>
+      </p:pic>
+    </p:spTree>
+    <p:extLst>
+      <p:ext uri="{BB962C8B-B14F-4D97-AF65-F5344CB8AC3E}">
+        <p14:creationId xmlns:p14="http://schemas.microsoft.com/office/powerpoint/2010/main" val="506372197"/>
       </p:ext>
     </p:extLst>
   </p:cSld>
@@ -18076,7 +17530,7 @@
         <p:cNvPr id="1" name="">
           <a:extLst>
             <a:ext uri="{FF2B5EF4-FFF2-40B4-BE49-F238E27FC236}">
-              <a16:creationId xmlns:a16="http://schemas.microsoft.com/office/drawing/2014/main" id="{7C7B2D23-40F5-6BD1-0202-98DDFDABF268}"/>
+              <a16:creationId xmlns:a16="http://schemas.microsoft.com/office/drawing/2014/main" id="{F6967FDC-6CFF-31A5-02EE-29E744AAFAE7}"/>
             </a:ext>
           </a:extLst>
         </p:cNvPr>
@@ -18096,7 +17550,7 @@
           <p:cNvPr id="2" name="Title 1">
             <a:extLst>
               <a:ext uri="{FF2B5EF4-FFF2-40B4-BE49-F238E27FC236}">
-                <a16:creationId xmlns:a16="http://schemas.microsoft.com/office/drawing/2014/main" id="{A973CDF4-4957-10FA-D184-EF09BC05B811}"/>
+                <a16:creationId xmlns:a16="http://schemas.microsoft.com/office/drawing/2014/main" id="{DADFF486-671C-E1CE-FA76-12EEF57E58D2}"/>
               </a:ext>
             </a:extLst>
           </p:cNvPr>
@@ -18119,17 +17573,17 @@
           <a:p>
             <a:r>
               <a:rPr lang="en-US" dirty="0"/>
-              <a:t>Model comparison</a:t>
+              <a:t>Coefficients of Linear regression</a:t>
             </a:r>
           </a:p>
         </p:txBody>
       </p:sp>
       <p:pic>
         <p:nvPicPr>
-          <p:cNvPr id="4" name="Picture 3" descr="A graph showing the performance of a model&#10;&#10;Description automatically generated">
-            <a:extLst>
-              <a:ext uri="{FF2B5EF4-FFF2-40B4-BE49-F238E27FC236}">
-                <a16:creationId xmlns:a16="http://schemas.microsoft.com/office/drawing/2014/main" id="{65A4B9B1-626D-9154-25AD-411EB926840B}"/>
+          <p:cNvPr id="9" name="Picture 8">
+            <a:extLst>
+              <a:ext uri="{FF2B5EF4-FFF2-40B4-BE49-F238E27FC236}">
+                <a16:creationId xmlns:a16="http://schemas.microsoft.com/office/drawing/2014/main" id="{D0017D2E-4CCA-0A88-B534-9472D32CEE49}"/>
               </a:ext>
             </a:extLst>
           </p:cNvPr>
@@ -18146,8 +17600,110 @@
         </p:blipFill>
         <p:spPr>
           <a:xfrm>
-            <a:off x="1523991" y="1011719"/>
-            <a:ext cx="9144018" cy="5486411"/>
+            <a:off x="419256" y="1581088"/>
+            <a:ext cx="3839111" cy="2229161"/>
+          </a:xfrm>
+          <a:prstGeom prst="rect">
+            <a:avLst/>
+          </a:prstGeom>
+        </p:spPr>
+      </p:pic>
+      <p:sp>
+        <p:nvSpPr>
+          <p:cNvPr id="10" name="TextBox 9">
+            <a:extLst>
+              <a:ext uri="{FF2B5EF4-FFF2-40B4-BE49-F238E27FC236}">
+                <a16:creationId xmlns:a16="http://schemas.microsoft.com/office/drawing/2014/main" id="{207DA2CF-1EF4-CC09-6DCB-8617E8A76D2D}"/>
+              </a:ext>
+            </a:extLst>
+          </p:cNvPr>
+          <p:cNvSpPr txBox="1"/>
+          <p:nvPr/>
+        </p:nvSpPr>
+        <p:spPr>
+          <a:xfrm>
+            <a:off x="1340204" y="3810249"/>
+            <a:ext cx="1997213" cy="369332"/>
+          </a:xfrm>
+          <a:prstGeom prst="rect">
+            <a:avLst/>
+          </a:prstGeom>
+          <a:noFill/>
+        </p:spPr>
+        <p:txBody>
+          <a:bodyPr wrap="none" rtlCol="0">
+            <a:spAutoFit/>
+          </a:bodyPr>
+          <a:lstStyle/>
+          <a:p>
+            <a:r>
+              <a:rPr lang="en-GB" dirty="0"/>
+              <a:t>Linear Regression</a:t>
+            </a:r>
+            <a:endParaRPr lang="en-US" dirty="0"/>
+          </a:p>
+        </p:txBody>
+      </p:sp>
+      <p:sp>
+        <p:nvSpPr>
+          <p:cNvPr id="12" name="TextBox 11">
+            <a:extLst>
+              <a:ext uri="{FF2B5EF4-FFF2-40B4-BE49-F238E27FC236}">
+                <a16:creationId xmlns:a16="http://schemas.microsoft.com/office/drawing/2014/main" id="{0577A9D3-C4F2-AC38-B728-FB39D5695434}"/>
+              </a:ext>
+            </a:extLst>
+          </p:cNvPr>
+          <p:cNvSpPr txBox="1"/>
+          <p:nvPr/>
+        </p:nvSpPr>
+        <p:spPr>
+          <a:xfrm>
+            <a:off x="7277189" y="3810250"/>
+            <a:ext cx="3163045" cy="369332"/>
+          </a:xfrm>
+          <a:prstGeom prst="rect">
+            <a:avLst/>
+          </a:prstGeom>
+          <a:noFill/>
+        </p:spPr>
+        <p:txBody>
+          <a:bodyPr wrap="none" rtlCol="0">
+            <a:spAutoFit/>
+          </a:bodyPr>
+          <a:lstStyle/>
+          <a:p>
+            <a:r>
+              <a:rPr lang="en-GB" dirty="0"/>
+              <a:t>Regularized Linear Regression</a:t>
+            </a:r>
+            <a:endParaRPr lang="en-US" dirty="0"/>
+          </a:p>
+        </p:txBody>
+      </p:sp>
+      <p:pic>
+        <p:nvPicPr>
+          <p:cNvPr id="14" name="Picture 13">
+            <a:extLst>
+              <a:ext uri="{FF2B5EF4-FFF2-40B4-BE49-F238E27FC236}">
+                <a16:creationId xmlns:a16="http://schemas.microsoft.com/office/drawing/2014/main" id="{07C15F08-10D0-AF89-65B7-FB08410D9E17}"/>
+              </a:ext>
+            </a:extLst>
+          </p:cNvPr>
+          <p:cNvPicPr>
+            <a:picLocks noChangeAspect="1"/>
+          </p:cNvPicPr>
+          <p:nvPr/>
+        </p:nvPicPr>
+        <p:blipFill>
+          <a:blip r:embed="rId3"/>
+          <a:stretch>
+            <a:fillRect/>
+          </a:stretch>
+        </p:blipFill>
+        <p:spPr>
+          <a:xfrm>
+            <a:off x="6906492" y="1581088"/>
+            <a:ext cx="3896185" cy="2229161"/>
           </a:xfrm>
           <a:prstGeom prst="rect">
             <a:avLst/>
@@ -18157,7 +17713,403 @@
     </p:spTree>
     <p:extLst>
       <p:ext uri="{BB962C8B-B14F-4D97-AF65-F5344CB8AC3E}">
-        <p14:creationId xmlns:p14="http://schemas.microsoft.com/office/powerpoint/2010/main" val="1933889912"/>
+        <p14:creationId xmlns:p14="http://schemas.microsoft.com/office/powerpoint/2010/main" val="321821009"/>
+      </p:ext>
+    </p:extLst>
+  </p:cSld>
+  <p:clrMapOvr>
+    <a:masterClrMapping/>
+  </p:clrMapOvr>
+</p:sld>
+</file>
+
+<file path=ppt/slides/slide21.xml><?xml version="1.0" encoding="utf-8"?>
+<p:sld xmlns:a="http://schemas.openxmlformats.org/drawingml/2006/main" xmlns:r="http://schemas.openxmlformats.org/officeDocument/2006/relationships" xmlns:p="http://schemas.openxmlformats.org/presentationml/2006/main">
+  <p:cSld>
+    <p:spTree>
+      <p:nvGrpSpPr>
+        <p:cNvPr id="1" name="">
+          <a:extLst>
+            <a:ext uri="{FF2B5EF4-FFF2-40B4-BE49-F238E27FC236}">
+              <a16:creationId xmlns:a16="http://schemas.microsoft.com/office/drawing/2014/main" id="{638E12B4-CDE4-5832-5678-C70EFA6FD05A}"/>
+            </a:ext>
+          </a:extLst>
+        </p:cNvPr>
+        <p:cNvGrpSpPr/>
+        <p:nvPr/>
+      </p:nvGrpSpPr>
+      <p:grpSpPr>
+        <a:xfrm>
+          <a:off x="0" y="0"/>
+          <a:ext cx="0" cy="0"/>
+          <a:chOff x="0" y="0"/>
+          <a:chExt cx="0" cy="0"/>
+        </a:xfrm>
+      </p:grpSpPr>
+      <p:sp>
+        <p:nvSpPr>
+          <p:cNvPr id="2" name="Title 1">
+            <a:extLst>
+              <a:ext uri="{FF2B5EF4-FFF2-40B4-BE49-F238E27FC236}">
+                <a16:creationId xmlns:a16="http://schemas.microsoft.com/office/drawing/2014/main" id="{FCB1C369-C2DC-FD36-DB41-73C3F9BDD3B9}"/>
+              </a:ext>
+            </a:extLst>
+          </p:cNvPr>
+          <p:cNvSpPr>
+            <a:spLocks noGrp="1"/>
+          </p:cNvSpPr>
+          <p:nvPr>
+            <p:ph type="title"/>
+          </p:nvPr>
+        </p:nvSpPr>
+        <p:spPr>
+          <a:xfrm>
+            <a:off x="1885156" y="72991"/>
+            <a:ext cx="8421688" cy="1325563"/>
+          </a:xfrm>
+        </p:spPr>
+        <p:txBody>
+          <a:bodyPr/>
+          <a:lstStyle/>
+          <a:p>
+            <a:r>
+              <a:rPr lang="en-US" dirty="0"/>
+              <a:t>Residual Plots(SVM)</a:t>
+            </a:r>
+          </a:p>
+        </p:txBody>
+      </p:sp>
+      <p:pic>
+        <p:nvPicPr>
+          <p:cNvPr id="3" name="Picture 2" descr="A graph showing a plot of values&#10;&#10;Description automatically generated with medium confidence">
+            <a:extLst>
+              <a:ext uri="{FF2B5EF4-FFF2-40B4-BE49-F238E27FC236}">
+                <a16:creationId xmlns:a16="http://schemas.microsoft.com/office/drawing/2014/main" id="{4BD5D58C-5A99-3F54-3BDE-D36709BAF10D}"/>
+              </a:ext>
+            </a:extLst>
+          </p:cNvPr>
+          <p:cNvPicPr>
+            <a:picLocks noChangeAspect="1"/>
+          </p:cNvPicPr>
+          <p:nvPr/>
+        </p:nvPicPr>
+        <p:blipFill>
+          <a:blip r:embed="rId2"/>
+          <a:stretch>
+            <a:fillRect/>
+          </a:stretch>
+        </p:blipFill>
+        <p:spPr>
+          <a:xfrm>
+            <a:off x="3169914" y="1398554"/>
+            <a:ext cx="5852172" cy="4389129"/>
+          </a:xfrm>
+          <a:prstGeom prst="rect">
+            <a:avLst/>
+          </a:prstGeom>
+        </p:spPr>
+      </p:pic>
+    </p:spTree>
+    <p:extLst>
+      <p:ext uri="{BB962C8B-B14F-4D97-AF65-F5344CB8AC3E}">
+        <p14:creationId xmlns:p14="http://schemas.microsoft.com/office/powerpoint/2010/main" val="3150362829"/>
+      </p:ext>
+    </p:extLst>
+  </p:cSld>
+  <p:clrMapOvr>
+    <a:masterClrMapping/>
+  </p:clrMapOvr>
+</p:sld>
+</file>
+
+<file path=ppt/slides/slide22.xml><?xml version="1.0" encoding="utf-8"?>
+<p:sld xmlns:a="http://schemas.openxmlformats.org/drawingml/2006/main" xmlns:r="http://schemas.openxmlformats.org/officeDocument/2006/relationships" xmlns:p="http://schemas.openxmlformats.org/presentationml/2006/main">
+  <p:cSld>
+    <p:spTree>
+      <p:nvGrpSpPr>
+        <p:cNvPr id="1" name="">
+          <a:extLst>
+            <a:ext uri="{FF2B5EF4-FFF2-40B4-BE49-F238E27FC236}">
+              <a16:creationId xmlns:a16="http://schemas.microsoft.com/office/drawing/2014/main" id="{F07818E8-0014-0A5A-B04E-DAE943B932A6}"/>
+            </a:ext>
+          </a:extLst>
+        </p:cNvPr>
+        <p:cNvGrpSpPr/>
+        <p:nvPr/>
+      </p:nvGrpSpPr>
+      <p:grpSpPr>
+        <a:xfrm>
+          <a:off x="0" y="0"/>
+          <a:ext cx="0" cy="0"/>
+          <a:chOff x="0" y="0"/>
+          <a:chExt cx="0" cy="0"/>
+        </a:xfrm>
+      </p:grpSpPr>
+      <p:sp>
+        <p:nvSpPr>
+          <p:cNvPr id="2" name="Title 1">
+            <a:extLst>
+              <a:ext uri="{FF2B5EF4-FFF2-40B4-BE49-F238E27FC236}">
+                <a16:creationId xmlns:a16="http://schemas.microsoft.com/office/drawing/2014/main" id="{52A20A02-D5FB-7A0F-79A7-E7AAC5B78023}"/>
+              </a:ext>
+            </a:extLst>
+          </p:cNvPr>
+          <p:cNvSpPr>
+            <a:spLocks noGrp="1"/>
+          </p:cNvSpPr>
+          <p:nvPr>
+            <p:ph type="title"/>
+          </p:nvPr>
+        </p:nvSpPr>
+        <p:spPr>
+          <a:xfrm>
+            <a:off x="1885156" y="72991"/>
+            <a:ext cx="8421688" cy="1325563"/>
+          </a:xfrm>
+        </p:spPr>
+        <p:txBody>
+          <a:bodyPr/>
+          <a:lstStyle/>
+          <a:p>
+            <a:r>
+              <a:rPr lang="en-US" dirty="0"/>
+              <a:t>Residual Plots(Random Forest)</a:t>
+            </a:r>
+          </a:p>
+        </p:txBody>
+      </p:sp>
+      <p:pic>
+        <p:nvPicPr>
+          <p:cNvPr id="4" name="Picture 3" descr="A graph showing a plot of a forest&#10;&#10;Description automatically generated with medium confidence">
+            <a:extLst>
+              <a:ext uri="{FF2B5EF4-FFF2-40B4-BE49-F238E27FC236}">
+                <a16:creationId xmlns:a16="http://schemas.microsoft.com/office/drawing/2014/main" id="{5270BD96-A455-5518-09F9-CEA6B17468B9}"/>
+              </a:ext>
+            </a:extLst>
+          </p:cNvPr>
+          <p:cNvPicPr>
+            <a:picLocks noChangeAspect="1"/>
+          </p:cNvPicPr>
+          <p:nvPr/>
+        </p:nvPicPr>
+        <p:blipFill>
+          <a:blip r:embed="rId2"/>
+          <a:stretch>
+            <a:fillRect/>
+          </a:stretch>
+        </p:blipFill>
+        <p:spPr>
+          <a:xfrm>
+            <a:off x="3169914" y="1398554"/>
+            <a:ext cx="5852172" cy="4389129"/>
+          </a:xfrm>
+          <a:prstGeom prst="rect">
+            <a:avLst/>
+          </a:prstGeom>
+        </p:spPr>
+      </p:pic>
+    </p:spTree>
+    <p:extLst>
+      <p:ext uri="{BB962C8B-B14F-4D97-AF65-F5344CB8AC3E}">
+        <p14:creationId xmlns:p14="http://schemas.microsoft.com/office/powerpoint/2010/main" val="4096186257"/>
+      </p:ext>
+    </p:extLst>
+  </p:cSld>
+  <p:clrMapOvr>
+    <a:masterClrMapping/>
+  </p:clrMapOvr>
+</p:sld>
+</file>
+
+<file path=ppt/slides/slide23.xml><?xml version="1.0" encoding="utf-8"?>
+<p:sld xmlns:a="http://schemas.openxmlformats.org/drawingml/2006/main" xmlns:r="http://schemas.openxmlformats.org/officeDocument/2006/relationships" xmlns:p="http://schemas.openxmlformats.org/presentationml/2006/main">
+  <p:cSld>
+    <p:spTree>
+      <p:nvGrpSpPr>
+        <p:cNvPr id="1" name="">
+          <a:extLst>
+            <a:ext uri="{FF2B5EF4-FFF2-40B4-BE49-F238E27FC236}">
+              <a16:creationId xmlns:a16="http://schemas.microsoft.com/office/drawing/2014/main" id="{90A295B1-E7AE-4C09-497D-9825F069CDE7}"/>
+            </a:ext>
+          </a:extLst>
+        </p:cNvPr>
+        <p:cNvGrpSpPr/>
+        <p:nvPr/>
+      </p:nvGrpSpPr>
+      <p:grpSpPr>
+        <a:xfrm>
+          <a:off x="0" y="0"/>
+          <a:ext cx="0" cy="0"/>
+          <a:chOff x="0" y="0"/>
+          <a:chExt cx="0" cy="0"/>
+        </a:xfrm>
+      </p:grpSpPr>
+      <p:sp>
+        <p:nvSpPr>
+          <p:cNvPr id="2" name="Title 1">
+            <a:extLst>
+              <a:ext uri="{FF2B5EF4-FFF2-40B4-BE49-F238E27FC236}">
+                <a16:creationId xmlns:a16="http://schemas.microsoft.com/office/drawing/2014/main" id="{533DA851-BEEF-113D-D816-A4A2E667F527}"/>
+              </a:ext>
+            </a:extLst>
+          </p:cNvPr>
+          <p:cNvSpPr>
+            <a:spLocks noGrp="1"/>
+          </p:cNvSpPr>
+          <p:nvPr>
+            <p:ph type="title"/>
+          </p:nvPr>
+        </p:nvSpPr>
+        <p:spPr>
+          <a:xfrm>
+            <a:off x="1885156" y="72991"/>
+            <a:ext cx="8421688" cy="1325563"/>
+          </a:xfrm>
+        </p:spPr>
+        <p:txBody>
+          <a:bodyPr/>
+          <a:lstStyle/>
+          <a:p>
+            <a:r>
+              <a:rPr lang="en-US" dirty="0"/>
+              <a:t>Coefficients of Random Forest</a:t>
+            </a:r>
+          </a:p>
+        </p:txBody>
+      </p:sp>
+      <p:pic>
+        <p:nvPicPr>
+          <p:cNvPr id="4" name="Picture 3">
+            <a:extLst>
+              <a:ext uri="{FF2B5EF4-FFF2-40B4-BE49-F238E27FC236}">
+                <a16:creationId xmlns:a16="http://schemas.microsoft.com/office/drawing/2014/main" id="{A3230592-3BE6-0111-9EE3-AD2745F1A6C9}"/>
+              </a:ext>
+            </a:extLst>
+          </p:cNvPr>
+          <p:cNvPicPr>
+            <a:picLocks noChangeAspect="1"/>
+          </p:cNvPicPr>
+          <p:nvPr/>
+        </p:nvPicPr>
+        <p:blipFill>
+          <a:blip r:embed="rId2"/>
+          <a:stretch>
+            <a:fillRect/>
+          </a:stretch>
+        </p:blipFill>
+        <p:spPr>
+          <a:xfrm>
+            <a:off x="3531516" y="1843165"/>
+            <a:ext cx="5128968" cy="3018545"/>
+          </a:xfrm>
+          <a:prstGeom prst="rect">
+            <a:avLst/>
+          </a:prstGeom>
+        </p:spPr>
+      </p:pic>
+    </p:spTree>
+    <p:extLst>
+      <p:ext uri="{BB962C8B-B14F-4D97-AF65-F5344CB8AC3E}">
+        <p14:creationId xmlns:p14="http://schemas.microsoft.com/office/powerpoint/2010/main" val="2852585974"/>
+      </p:ext>
+    </p:extLst>
+  </p:cSld>
+  <p:clrMapOvr>
+    <a:masterClrMapping/>
+  </p:clrMapOvr>
+</p:sld>
+</file>
+
+<file path=ppt/slides/slide24.xml><?xml version="1.0" encoding="utf-8"?>
+<p:sld xmlns:a="http://schemas.openxmlformats.org/drawingml/2006/main" xmlns:r="http://schemas.openxmlformats.org/officeDocument/2006/relationships" xmlns:p="http://schemas.openxmlformats.org/presentationml/2006/main">
+  <p:cSld>
+    <p:spTree>
+      <p:nvGrpSpPr>
+        <p:cNvPr id="1" name="">
+          <a:extLst>
+            <a:ext uri="{FF2B5EF4-FFF2-40B4-BE49-F238E27FC236}">
+              <a16:creationId xmlns:a16="http://schemas.microsoft.com/office/drawing/2014/main" id="{EA1AC606-4868-0211-8E24-B6D30A0304D5}"/>
+            </a:ext>
+          </a:extLst>
+        </p:cNvPr>
+        <p:cNvGrpSpPr/>
+        <p:nvPr/>
+      </p:nvGrpSpPr>
+      <p:grpSpPr>
+        <a:xfrm>
+          <a:off x="0" y="0"/>
+          <a:ext cx="0" cy="0"/>
+          <a:chOff x="0" y="0"/>
+          <a:chExt cx="0" cy="0"/>
+        </a:xfrm>
+      </p:grpSpPr>
+      <p:sp>
+        <p:nvSpPr>
+          <p:cNvPr id="2" name="Title 1">
+            <a:extLst>
+              <a:ext uri="{FF2B5EF4-FFF2-40B4-BE49-F238E27FC236}">
+                <a16:creationId xmlns:a16="http://schemas.microsoft.com/office/drawing/2014/main" id="{B022C7DF-27C9-9F4E-3177-EFBA38F9EC7C}"/>
+              </a:ext>
+            </a:extLst>
+          </p:cNvPr>
+          <p:cNvSpPr>
+            <a:spLocks noGrp="1"/>
+          </p:cNvSpPr>
+          <p:nvPr>
+            <p:ph type="title"/>
+          </p:nvPr>
+        </p:nvSpPr>
+        <p:spPr>
+          <a:xfrm>
+            <a:off x="1885156" y="72991"/>
+            <a:ext cx="8421688" cy="1325563"/>
+          </a:xfrm>
+        </p:spPr>
+        <p:txBody>
+          <a:bodyPr/>
+          <a:lstStyle/>
+          <a:p>
+            <a:r>
+              <a:rPr lang="en-US" dirty="0"/>
+              <a:t>Residual Plots(Neural network)</a:t>
+            </a:r>
+          </a:p>
+        </p:txBody>
+      </p:sp>
+      <p:pic>
+        <p:nvPicPr>
+          <p:cNvPr id="5" name="Picture 4" descr="A graph showing a plot of residuals&#10;&#10;Description automatically generated with medium confidence">
+            <a:extLst>
+              <a:ext uri="{FF2B5EF4-FFF2-40B4-BE49-F238E27FC236}">
+                <a16:creationId xmlns:a16="http://schemas.microsoft.com/office/drawing/2014/main" id="{B639FE99-457D-9DDA-7836-A7038348EA22}"/>
+              </a:ext>
+            </a:extLst>
+          </p:cNvPr>
+          <p:cNvPicPr>
+            <a:picLocks noChangeAspect="1"/>
+          </p:cNvPicPr>
+          <p:nvPr/>
+        </p:nvPicPr>
+        <p:blipFill>
+          <a:blip r:embed="rId2"/>
+          <a:stretch>
+            <a:fillRect/>
+          </a:stretch>
+        </p:blipFill>
+        <p:spPr>
+          <a:xfrm>
+            <a:off x="3169914" y="1398554"/>
+            <a:ext cx="5852172" cy="4389129"/>
+          </a:xfrm>
+          <a:prstGeom prst="rect">
+            <a:avLst/>
+          </a:prstGeom>
+        </p:spPr>
+      </p:pic>
+    </p:spTree>
+    <p:extLst>
+      <p:ext uri="{BB962C8B-B14F-4D97-AF65-F5344CB8AC3E}">
+        <p14:creationId xmlns:p14="http://schemas.microsoft.com/office/powerpoint/2010/main" val="3510315542"/>
       </p:ext>
     </p:extLst>
   </p:cSld>
@@ -18212,7 +18164,7 @@
           <a:p>
             <a:r>
               <a:rPr lang="en-US" dirty="0"/>
-              <a:t>Dataset</a:t>
+              <a:t>Dataset Interpretation</a:t>
             </a:r>
           </a:p>
         </p:txBody>
@@ -18267,7 +18219,7 @@
         <p:spPr>
           <a:xfrm>
             <a:off x="832919" y="3161003"/>
-            <a:ext cx="2920864" cy="1323439"/>
+            <a:ext cx="4324902" cy="1015663"/>
           </a:xfrm>
           <a:prstGeom prst="rect">
             <a:avLst/>
@@ -18282,35 +18234,28 @@
           <a:p>
             <a:r>
               <a:rPr lang="en-US" sz="2000" dirty="0"/>
-              <a:t>Target Variable</a:t>
-            </a:r>
-          </a:p>
-          <a:p>
-            <a:r>
-              <a:rPr lang="en-US" sz="2000" dirty="0"/>
-              <a:t>- casual</a:t>
-            </a:r>
-          </a:p>
-          <a:p>
-            <a:r>
-              <a:rPr lang="en-US" sz="2000" dirty="0"/>
-              <a:t>- registered</a:t>
-            </a:r>
-          </a:p>
-          <a:p>
-            <a:r>
-              <a:rPr lang="en-US" sz="2000" dirty="0"/>
-              <a:t>- </a:t>
-            </a:r>
-            <a:r>
-              <a:rPr lang="en-US" sz="2000" i="1" dirty="0" err="1"/>
-              <a:t>cnt</a:t>
-            </a:r>
+              <a:t>Target Variable Dependent Variables:</a:t>
+            </a:r>
+          </a:p>
+          <a:p>
+            <a:pPr marL="342900" indent="-342900">
+              <a:buFontTx/>
+              <a:buChar char="-"/>
+            </a:pPr>
             <a:r>
               <a:rPr lang="en-US" sz="2000" i="1" dirty="0"/>
-              <a:t>: casual + registered</a:t>
-            </a:r>
-            <a:endParaRPr lang="en-US" sz="2000" dirty="0"/>
+              <a:t>casual</a:t>
+            </a:r>
+          </a:p>
+          <a:p>
+            <a:pPr marL="342900" indent="-342900">
+              <a:buFontTx/>
+              <a:buChar char="-"/>
+            </a:pPr>
+            <a:r>
+              <a:rPr lang="en-US" sz="2000" i="1" dirty="0"/>
+              <a:t>registered</a:t>
+            </a:r>
           </a:p>
         </p:txBody>
       </p:sp>
@@ -18344,7 +18289,11 @@
           <a:p>
             <a:r>
               <a:rPr lang="en-US" dirty="0"/>
-              <a:t>Weather</a:t>
+              <a:t>Variables describing </a:t>
+            </a:r>
+            <a:r>
+              <a:rPr lang="en-US" b="1" dirty="0"/>
+              <a:t>weather</a:t>
             </a:r>
           </a:p>
           <a:p>
@@ -18421,7 +18370,7 @@
         </p:nvSpPr>
         <p:spPr>
           <a:xfrm>
-            <a:off x="6690511" y="1145529"/>
+            <a:off x="6699565" y="1141268"/>
             <a:ext cx="4527714" cy="2585323"/>
           </a:xfrm>
           <a:prstGeom prst="rect">
@@ -18437,7 +18386,11 @@
           <a:p>
             <a:r>
               <a:rPr lang="en-US" dirty="0"/>
-              <a:t>Time</a:t>
+              <a:t>Variables describing </a:t>
+            </a:r>
+            <a:r>
+              <a:rPr lang="en-US" b="1" dirty="0"/>
+              <a:t>time</a:t>
             </a:r>
           </a:p>
           <a:p>
@@ -18528,6 +18481,55 @@
               <a:t> (0 or 1)</a:t>
             </a:r>
             <a:endParaRPr lang="en-US" dirty="0"/>
+          </a:p>
+        </p:txBody>
+      </p:sp>
+      <p:sp>
+        <p:nvSpPr>
+          <p:cNvPr id="3" name="TextBox 2">
+            <a:extLst>
+              <a:ext uri="{FF2B5EF4-FFF2-40B4-BE49-F238E27FC236}">
+                <a16:creationId xmlns:a16="http://schemas.microsoft.com/office/drawing/2014/main" id="{C5578537-AD71-F093-9077-D14F97E95836}"/>
+              </a:ext>
+            </a:extLst>
+          </p:cNvPr>
+          <p:cNvSpPr txBox="1"/>
+          <p:nvPr/>
+        </p:nvSpPr>
+        <p:spPr>
+          <a:xfrm>
+            <a:off x="832919" y="4176666"/>
+            <a:ext cx="3119187" cy="707886"/>
+          </a:xfrm>
+          <a:prstGeom prst="rect">
+            <a:avLst/>
+          </a:prstGeom>
+          <a:noFill/>
+        </p:spPr>
+        <p:txBody>
+          <a:bodyPr wrap="none" rtlCol="0">
+            <a:spAutoFit/>
+          </a:bodyPr>
+          <a:lstStyle/>
+          <a:p>
+            <a:r>
+              <a:rPr lang="en-US" sz="2000" dirty="0"/>
+              <a:t>Target Variable:</a:t>
+            </a:r>
+          </a:p>
+          <a:p>
+            <a:pPr marL="342900" indent="-342900">
+              <a:buFontTx/>
+              <a:buChar char="-"/>
+            </a:pPr>
+            <a:r>
+              <a:rPr lang="en-US" sz="2000" i="1" dirty="0" err="1"/>
+              <a:t>cnt</a:t>
+            </a:r>
+            <a:r>
+              <a:rPr lang="en-US" sz="2000" i="1" dirty="0"/>
+              <a:t>: casual + registered</a:t>
+            </a:r>
           </a:p>
         </p:txBody>
       </p:sp>
@@ -18594,9 +18596,10 @@
           <a:lstStyle/>
           <a:p>
             <a:r>
-              <a:rPr lang="en-US" dirty="0"/>
-              <a:t>Dataset</a:t>
-            </a:r>
+              <a:rPr lang="en-GB" dirty="0"/>
+              <a:t>Dataset Cleaning</a:t>
+            </a:r>
+            <a:endParaRPr lang="en-US" dirty="0"/>
           </a:p>
         </p:txBody>
       </p:sp>
@@ -18719,7 +18722,7 @@
         <p:spPr>
           <a:xfrm>
             <a:off x="4725886" y="5712736"/>
-            <a:ext cx="1818383" cy="369332"/>
+            <a:ext cx="1838260" cy="369332"/>
           </a:xfrm>
           <a:prstGeom prst="rect">
             <a:avLst/>
@@ -18733,8 +18736,12 @@
           <a:lstStyle/>
           <a:p>
             <a:r>
+              <a:rPr lang="en-US" dirty="0" err="1"/>
+              <a:t>NaN</a:t>
+            </a:r>
+            <a:r>
               <a:rPr lang="en-US" dirty="0"/>
-              <a:t>Nan value table</a:t>
+              <a:t> Value Table</a:t>
             </a:r>
           </a:p>
         </p:txBody>
@@ -18906,9 +18913,14 @@
           <a:lstStyle/>
           <a:p>
             <a:r>
-              <a:rPr lang="en-US" dirty="0"/>
-              <a:t>EDA</a:t>
-            </a:r>
+              <a:rPr lang="en-GB" dirty="0"/>
+              <a:t>H</a:t>
+            </a:r>
+            <a:r>
+              <a:rPr lang="en-US" dirty="0" err="1"/>
+              <a:t>istograms</a:t>
+            </a:r>
+            <a:endParaRPr lang="en-US" dirty="0"/>
           </a:p>
         </p:txBody>
       </p:sp>
@@ -19035,9 +19047,10 @@
           <a:lstStyle/>
           <a:p>
             <a:r>
-              <a:rPr lang="en-US" dirty="0"/>
-              <a:t>EDA</a:t>
-            </a:r>
+              <a:rPr lang="en-GB" dirty="0"/>
+              <a:t>Histograms</a:t>
+            </a:r>
+            <a:endParaRPr lang="en-US" dirty="0"/>
           </a:p>
         </p:txBody>
       </p:sp>
@@ -19103,10 +19116,10 @@
       </p:pic>
       <p:pic>
         <p:nvPicPr>
-          <p:cNvPr id="19" name="Picture 18" descr="A graph with blue rectangular bars&#10;&#10;Description automatically generated with medium confidence">
-            <a:extLst>
-              <a:ext uri="{FF2B5EF4-FFF2-40B4-BE49-F238E27FC236}">
-                <a16:creationId xmlns:a16="http://schemas.microsoft.com/office/drawing/2014/main" id="{C485D3C5-2D39-AF61-E0DC-FD5970BFF0BC}"/>
+          <p:cNvPr id="4" name="Picture 3" descr="A graph of blue bars&#10;&#10;Description automatically generated with medium confidence">
+            <a:extLst>
+              <a:ext uri="{FF2B5EF4-FFF2-40B4-BE49-F238E27FC236}">
+                <a16:creationId xmlns:a16="http://schemas.microsoft.com/office/drawing/2014/main" id="{29EC17E0-45A0-AEA2-0399-978F66378FF2}"/>
               </a:ext>
             </a:extLst>
           </p:cNvPr>
@@ -19123,8 +19136,8 @@
         </p:blipFill>
         <p:spPr>
           <a:xfrm>
-            <a:off x="8223469" y="1851225"/>
-            <a:ext cx="3887038" cy="2915278"/>
+            <a:off x="8223469" y="1851224"/>
+            <a:ext cx="3887037" cy="2915278"/>
           </a:xfrm>
           <a:prstGeom prst="rect">
             <a:avLst/>
@@ -19195,7 +19208,7 @@
           <a:p>
             <a:r>
               <a:rPr lang="en-US" dirty="0"/>
-              <a:t>EDA</a:t>
+              <a:t>Windspeed plots</a:t>
             </a:r>
           </a:p>
         </p:txBody>
@@ -19281,7 +19294,7 @@
         <p:cNvPr id="1" name="">
           <a:extLst>
             <a:ext uri="{FF2B5EF4-FFF2-40B4-BE49-F238E27FC236}">
-              <a16:creationId xmlns:a16="http://schemas.microsoft.com/office/drawing/2014/main" id="{658EF261-4AC7-DF04-DAAD-544C3B783B08}"/>
+              <a16:creationId xmlns:a16="http://schemas.microsoft.com/office/drawing/2014/main" id="{1102994D-E6A5-A008-6045-C98B220940F2}"/>
             </a:ext>
           </a:extLst>
         </p:cNvPr>
@@ -19296,45 +19309,12 @@
           <a:chExt cx="0" cy="0"/>
         </a:xfrm>
       </p:grpSpPr>
-      <p:sp>
-        <p:nvSpPr>
-          <p:cNvPr id="2" name="Title 1">
-            <a:extLst>
-              <a:ext uri="{FF2B5EF4-FFF2-40B4-BE49-F238E27FC236}">
-                <a16:creationId xmlns:a16="http://schemas.microsoft.com/office/drawing/2014/main" id="{3B3F93C3-68CF-0339-366A-43F3D3CCFFE7}"/>
-              </a:ext>
-            </a:extLst>
-          </p:cNvPr>
-          <p:cNvSpPr>
-            <a:spLocks noGrp="1"/>
-          </p:cNvSpPr>
-          <p:nvPr>
-            <p:ph type="title"/>
-          </p:nvPr>
-        </p:nvSpPr>
-        <p:spPr>
-          <a:xfrm>
-            <a:off x="1885156" y="72991"/>
-            <a:ext cx="8421688" cy="1325563"/>
-          </a:xfrm>
-        </p:spPr>
-        <p:txBody>
-          <a:bodyPr/>
-          <a:lstStyle/>
-          <a:p>
-            <a:r>
-              <a:rPr lang="en-US" dirty="0"/>
-              <a:t>EDA</a:t>
-            </a:r>
-          </a:p>
-        </p:txBody>
-      </p:sp>
       <p:pic>
         <p:nvPicPr>
-          <p:cNvPr id="4" name="Picture 3" descr="A diagram of a box plot&#10;&#10;Description automatically generated">
-            <a:extLst>
-              <a:ext uri="{FF2B5EF4-FFF2-40B4-BE49-F238E27FC236}">
-                <a16:creationId xmlns:a16="http://schemas.microsoft.com/office/drawing/2014/main" id="{70E2231F-FE2C-8D7E-2A3E-D3BE72853599}"/>
+          <p:cNvPr id="13" name="Picture 12" descr="A graph of a bicycle&#10;&#10;Description automatically generated with medium confidence">
+            <a:extLst>
+              <a:ext uri="{FF2B5EF4-FFF2-40B4-BE49-F238E27FC236}">
+                <a16:creationId xmlns:a16="http://schemas.microsoft.com/office/drawing/2014/main" id="{41467109-52DE-1B80-C545-9A1350247F88}"/>
               </a:ext>
             </a:extLst>
           </p:cNvPr>
@@ -19351,8 +19331,101 @@
         </p:blipFill>
         <p:spPr>
           <a:xfrm>
-            <a:off x="3169914" y="1234435"/>
-            <a:ext cx="5852172" cy="4389129"/>
+            <a:off x="0" y="1707498"/>
+            <a:ext cx="4350590" cy="3262943"/>
+          </a:xfrm>
+          <a:prstGeom prst="rect">
+            <a:avLst/>
+          </a:prstGeom>
+        </p:spPr>
+      </p:pic>
+      <p:pic>
+        <p:nvPicPr>
+          <p:cNvPr id="5" name="Picture 4" descr="A graph of a graph of a number of bikes&#10;&#10;Description automatically generated with medium confidence">
+            <a:extLst>
+              <a:ext uri="{FF2B5EF4-FFF2-40B4-BE49-F238E27FC236}">
+                <a16:creationId xmlns:a16="http://schemas.microsoft.com/office/drawing/2014/main" id="{2FA789AB-DBB0-DA35-A5E6-27632EEC247B}"/>
+              </a:ext>
+            </a:extLst>
+          </p:cNvPr>
+          <p:cNvPicPr>
+            <a:picLocks noChangeAspect="1"/>
+          </p:cNvPicPr>
+          <p:nvPr/>
+        </p:nvPicPr>
+        <p:blipFill>
+          <a:blip r:embed="rId3"/>
+          <a:stretch>
+            <a:fillRect/>
+          </a:stretch>
+        </p:blipFill>
+        <p:spPr>
+          <a:xfrm>
+            <a:off x="3920704" y="1707499"/>
+            <a:ext cx="4350591" cy="3262943"/>
+          </a:xfrm>
+          <a:prstGeom prst="rect">
+            <a:avLst/>
+          </a:prstGeom>
+        </p:spPr>
+      </p:pic>
+      <p:sp>
+        <p:nvSpPr>
+          <p:cNvPr id="2" name="Title 1">
+            <a:extLst>
+              <a:ext uri="{FF2B5EF4-FFF2-40B4-BE49-F238E27FC236}">
+                <a16:creationId xmlns:a16="http://schemas.microsoft.com/office/drawing/2014/main" id="{52D25B60-287F-FD66-69B1-ABA33D16C28B}"/>
+              </a:ext>
+            </a:extLst>
+          </p:cNvPr>
+          <p:cNvSpPr>
+            <a:spLocks noGrp="1"/>
+          </p:cNvSpPr>
+          <p:nvPr>
+            <p:ph type="title"/>
+          </p:nvPr>
+        </p:nvSpPr>
+        <p:spPr>
+          <a:xfrm>
+            <a:off x="1885156" y="72991"/>
+            <a:ext cx="8421688" cy="1325563"/>
+          </a:xfrm>
+        </p:spPr>
+        <p:txBody>
+          <a:bodyPr/>
+          <a:lstStyle/>
+          <a:p>
+            <a:r>
+              <a:rPr lang="en-US" dirty="0"/>
+              <a:t>EDA</a:t>
+            </a:r>
+          </a:p>
+        </p:txBody>
+      </p:sp>
+      <p:pic>
+        <p:nvPicPr>
+          <p:cNvPr id="12" name="Picture 11" descr="A graph of a number of bikes&#10;&#10;Description automatically generated">
+            <a:extLst>
+              <a:ext uri="{FF2B5EF4-FFF2-40B4-BE49-F238E27FC236}">
+                <a16:creationId xmlns:a16="http://schemas.microsoft.com/office/drawing/2014/main" id="{B9BE9DD7-73C2-03C8-33FD-0E6F6CED0C90}"/>
+              </a:ext>
+            </a:extLst>
+          </p:cNvPr>
+          <p:cNvPicPr>
+            <a:picLocks noChangeAspect="1"/>
+          </p:cNvPicPr>
+          <p:nvPr/>
+        </p:nvPicPr>
+        <p:blipFill>
+          <a:blip r:embed="rId4"/>
+          <a:stretch>
+            <a:fillRect/>
+          </a:stretch>
+        </p:blipFill>
+        <p:spPr>
+          <a:xfrm>
+            <a:off x="7841412" y="1707499"/>
+            <a:ext cx="4350590" cy="3262943"/>
           </a:xfrm>
           <a:prstGeom prst="rect">
             <a:avLst/>
@@ -19362,7 +19435,7 @@
     </p:spTree>
     <p:extLst>
       <p:ext uri="{BB962C8B-B14F-4D97-AF65-F5344CB8AC3E}">
-        <p14:creationId xmlns:p14="http://schemas.microsoft.com/office/powerpoint/2010/main" val="2507869996"/>
+        <p14:creationId xmlns:p14="http://schemas.microsoft.com/office/powerpoint/2010/main" val="436408081"/>
       </p:ext>
     </p:extLst>
   </p:cSld>
@@ -20164,6 +20237,15 @@
 </file>
 
 <file path=customXml/item1.xml><?xml version="1.0" encoding="utf-8"?>
+<?mso-contentType ?>
+<FormTemplates xmlns="http://schemas.microsoft.com/sharepoint/v3/contenttype/forms">
+  <Display>DocumentLibraryForm</Display>
+  <Edit>DocumentLibraryForm</Edit>
+  <New>DocumentLibraryForm</New>
+</FormTemplates>
+</file>
+
+<file path=customXml/item2.xml><?xml version="1.0" encoding="utf-8"?>
 <p:properties xmlns:p="http://schemas.microsoft.com/office/2006/metadata/properties" xmlns:xsi="http://www.w3.org/2001/XMLSchema-instance" xmlns:pc="http://schemas.microsoft.com/office/infopath/2007/PartnerControls">
   <documentManagement>
     <_ip_UnifiedCompliancePolicyUIAction xmlns="http://schemas.microsoft.com/sharepoint/v3" xsi:nil="true"/>
@@ -20181,15 +20263,6 @@
     <MediaServiceKeyPoints xmlns="71af3243-3dd4-4a8d-8c0d-dd76da1f02a5" xsi:nil="true"/>
   </documentManagement>
 </p:properties>
-</file>
-
-<file path=customXml/item2.xml><?xml version="1.0" encoding="utf-8"?>
-<?mso-contentType ?>
-<FormTemplates xmlns="http://schemas.microsoft.com/sharepoint/v3/contenttype/forms">
-  <Display>DocumentLibraryForm</Display>
-  <Edit>DocumentLibraryForm</Edit>
-  <New>DocumentLibraryForm</New>
-</FormTemplates>
 </file>
 
 <file path=customXml/item3.xml><?xml version="1.0" encoding="utf-8"?>
@@ -20499,6 +20572,14 @@
 </file>
 
 <file path=customXml/itemProps1.xml><?xml version="1.0" encoding="utf-8"?>
+<ds:datastoreItem xmlns:ds="http://schemas.openxmlformats.org/officeDocument/2006/customXml" ds:itemID="{6966C46A-DC57-4209-80CD-9FE6C93151FF}">
+  <ds:schemaRefs>
+    <ds:schemaRef ds:uri="http://schemas.microsoft.com/sharepoint/v3/contenttype/forms"/>
+  </ds:schemaRefs>
+</ds:datastoreItem>
+</file>
+
+<file path=customXml/itemProps2.xml><?xml version="1.0" encoding="utf-8"?>
 <ds:datastoreItem xmlns:ds="http://schemas.openxmlformats.org/officeDocument/2006/customXml" ds:itemID="{BEFFFA3F-0FB5-4ED3-8906-A15B16577F44}">
   <ds:schemaRefs>
     <ds:schemaRef ds:uri="http://schemas.microsoft.com/office/2006/metadata/properties"/>
@@ -20506,14 +20587,6 @@
     <ds:schemaRef ds:uri="http://schemas.microsoft.com/sharepoint/v3"/>
     <ds:schemaRef ds:uri="71af3243-3dd4-4a8d-8c0d-dd76da1f02a5"/>
     <ds:schemaRef ds:uri="230e9df3-be65-4c73-a93b-d1236ebd677e"/>
-  </ds:schemaRefs>
-</ds:datastoreItem>
-</file>
-
-<file path=customXml/itemProps2.xml><?xml version="1.0" encoding="utf-8"?>
-<ds:datastoreItem xmlns:ds="http://schemas.openxmlformats.org/officeDocument/2006/customXml" ds:itemID="{6966C46A-DC57-4209-80CD-9FE6C93151FF}">
-  <ds:schemaRefs>
-    <ds:schemaRef ds:uri="http://schemas.microsoft.com/sharepoint/v3/contenttype/forms"/>
   </ds:schemaRefs>
 </ds:datastoreItem>
 </file>

</xml_diff>